<commit_message>
reordered to better fit exercises 4g
</commit_message>
<xml_diff>
--- a/lectures/3.2ScopeDocumentationConditionsLoops/lecture.pptx
+++ b/lectures/3.2ScopeDocumentationConditionsLoops/lecture.pptx
@@ -5,23 +5,24 @@
     <p:sldMasterId id="2147483648" r:id="rId1"/>
   </p:sldMasterIdLst>
   <p:notesMasterIdLst>
-    <p:notesMasterId r:id="rId16"/>
+    <p:notesMasterId r:id="rId17"/>
   </p:notesMasterIdLst>
   <p:sldIdLst>
     <p:sldId id="256" r:id="rId2"/>
-    <p:sldId id="314" r:id="rId3"/>
-    <p:sldId id="292" r:id="rId4"/>
-    <p:sldId id="294" r:id="rId5"/>
-    <p:sldId id="297" r:id="rId6"/>
-    <p:sldId id="299" r:id="rId7"/>
-    <p:sldId id="300" r:id="rId8"/>
-    <p:sldId id="298" r:id="rId9"/>
-    <p:sldId id="306" r:id="rId10"/>
-    <p:sldId id="302" r:id="rId11"/>
-    <p:sldId id="308" r:id="rId12"/>
-    <p:sldId id="304" r:id="rId13"/>
-    <p:sldId id="309" r:id="rId14"/>
-    <p:sldId id="307" r:id="rId15"/>
+    <p:sldId id="315" r:id="rId3"/>
+    <p:sldId id="314" r:id="rId4"/>
+    <p:sldId id="292" r:id="rId5"/>
+    <p:sldId id="294" r:id="rId6"/>
+    <p:sldId id="297" r:id="rId7"/>
+    <p:sldId id="299" r:id="rId8"/>
+    <p:sldId id="300" r:id="rId9"/>
+    <p:sldId id="298" r:id="rId10"/>
+    <p:sldId id="306" r:id="rId11"/>
+    <p:sldId id="302" r:id="rId12"/>
+    <p:sldId id="308" r:id="rId13"/>
+    <p:sldId id="304" r:id="rId14"/>
+    <p:sldId id="309" r:id="rId15"/>
+    <p:sldId id="307" r:id="rId16"/>
   </p:sldIdLst>
   <p:sldSz cx="12192000" cy="6858000"/>
   <p:notesSz cx="6858000" cy="9144000"/>
@@ -3940,7 +3941,7 @@
           <a:p>
             <a:fld id="{248031C6-E4B0-0444-A4A8-9CCE96EC2C9C}" type="datetimeFigureOut">
               <a:rPr lang="en-GB" smtClean="0"/>
-              <a:t>17/09/2019</a:t>
+              <a:t>18/09/2019</a:t>
             </a:fld>
             <a:endParaRPr lang="en-GB"/>
           </a:p>
@@ -4357,7 +4358,7 @@
           <a:p>
             <a:fld id="{66665395-52C5-5E4B-BB20-CD4E0BBC9899}" type="datetimeFigureOut">
               <a:rPr lang="en-GB" smtClean="0"/>
-              <a:t>17/09/2019</a:t>
+              <a:t>18/09/2019</a:t>
             </a:fld>
             <a:endParaRPr lang="en-GB"/>
           </a:p>
@@ -4557,7 +4558,7 @@
           <a:p>
             <a:fld id="{66665395-52C5-5E4B-BB20-CD4E0BBC9899}" type="datetimeFigureOut">
               <a:rPr lang="en-GB" smtClean="0"/>
-              <a:t>17/09/2019</a:t>
+              <a:t>18/09/2019</a:t>
             </a:fld>
             <a:endParaRPr lang="en-GB"/>
           </a:p>
@@ -4767,7 +4768,7 @@
           <a:p>
             <a:fld id="{66665395-52C5-5E4B-BB20-CD4E0BBC9899}" type="datetimeFigureOut">
               <a:rPr lang="en-GB" smtClean="0"/>
-              <a:t>17/09/2019</a:t>
+              <a:t>18/09/2019</a:t>
             </a:fld>
             <a:endParaRPr lang="en-GB"/>
           </a:p>
@@ -4967,7 +4968,7 @@
           <a:p>
             <a:fld id="{66665395-52C5-5E4B-BB20-CD4E0BBC9899}" type="datetimeFigureOut">
               <a:rPr lang="en-GB" smtClean="0"/>
-              <a:t>17/09/2019</a:t>
+              <a:t>18/09/2019</a:t>
             </a:fld>
             <a:endParaRPr lang="en-GB"/>
           </a:p>
@@ -5243,7 +5244,7 @@
           <a:p>
             <a:fld id="{66665395-52C5-5E4B-BB20-CD4E0BBC9899}" type="datetimeFigureOut">
               <a:rPr lang="en-GB" smtClean="0"/>
-              <a:t>17/09/2019</a:t>
+              <a:t>18/09/2019</a:t>
             </a:fld>
             <a:endParaRPr lang="en-GB"/>
           </a:p>
@@ -5511,7 +5512,7 @@
           <a:p>
             <a:fld id="{66665395-52C5-5E4B-BB20-CD4E0BBC9899}" type="datetimeFigureOut">
               <a:rPr lang="en-GB" smtClean="0"/>
-              <a:t>17/09/2019</a:t>
+              <a:t>18/09/2019</a:t>
             </a:fld>
             <a:endParaRPr lang="en-GB"/>
           </a:p>
@@ -5926,7 +5927,7 @@
           <a:p>
             <a:fld id="{66665395-52C5-5E4B-BB20-CD4E0BBC9899}" type="datetimeFigureOut">
               <a:rPr lang="en-GB" smtClean="0"/>
-              <a:t>17/09/2019</a:t>
+              <a:t>18/09/2019</a:t>
             </a:fld>
             <a:endParaRPr lang="en-GB"/>
           </a:p>
@@ -6068,7 +6069,7 @@
           <a:p>
             <a:fld id="{66665395-52C5-5E4B-BB20-CD4E0BBC9899}" type="datetimeFigureOut">
               <a:rPr lang="en-GB" smtClean="0"/>
-              <a:t>17/09/2019</a:t>
+              <a:t>18/09/2019</a:t>
             </a:fld>
             <a:endParaRPr lang="en-GB"/>
           </a:p>
@@ -6181,7 +6182,7 @@
           <a:p>
             <a:fld id="{66665395-52C5-5E4B-BB20-CD4E0BBC9899}" type="datetimeFigureOut">
               <a:rPr lang="en-GB" smtClean="0"/>
-              <a:t>17/09/2019</a:t>
+              <a:t>18/09/2019</a:t>
             </a:fld>
             <a:endParaRPr lang="en-GB"/>
           </a:p>
@@ -6494,7 +6495,7 @@
           <a:p>
             <a:fld id="{66665395-52C5-5E4B-BB20-CD4E0BBC9899}" type="datetimeFigureOut">
               <a:rPr lang="en-GB" smtClean="0"/>
-              <a:t>17/09/2019</a:t>
+              <a:t>18/09/2019</a:t>
             </a:fld>
             <a:endParaRPr lang="en-GB"/>
           </a:p>
@@ -6783,7 +6784,7 @@
           <a:p>
             <a:fld id="{66665395-52C5-5E4B-BB20-CD4E0BBC9899}" type="datetimeFigureOut">
               <a:rPr lang="en-GB" smtClean="0"/>
-              <a:t>17/09/2019</a:t>
+              <a:t>18/09/2019</a:t>
             </a:fld>
             <a:endParaRPr lang="en-GB"/>
           </a:p>
@@ -7026,7 +7027,7 @@
           <a:p>
             <a:fld id="{66665395-52C5-5E4B-BB20-CD4E0BBC9899}" type="datetimeFigureOut">
               <a:rPr lang="en-GB" smtClean="0"/>
-              <a:t>17/09/2019</a:t>
+              <a:t>18/09/2019</a:t>
             </a:fld>
             <a:endParaRPr lang="en-GB"/>
           </a:p>
@@ -7531,6 +7532,1572 @@
 </file>
 
 <file path=ppt/slides/slide10.xml><?xml version="1.0" encoding="utf-8"?>
+<p:sld xmlns:a="http://schemas.openxmlformats.org/drawingml/2006/main" xmlns:r="http://schemas.openxmlformats.org/officeDocument/2006/relationships" xmlns:p="http://schemas.openxmlformats.org/presentationml/2006/main">
+  <p:cSld>
+    <p:spTree>
+      <p:nvGrpSpPr>
+        <p:cNvPr id="1" name=""/>
+        <p:cNvGrpSpPr/>
+        <p:nvPr/>
+      </p:nvGrpSpPr>
+      <p:grpSpPr>
+        <a:xfrm>
+          <a:off x="0" y="0"/>
+          <a:ext cx="0" cy="0"/>
+          <a:chOff x="0" y="0"/>
+          <a:chExt cx="0" cy="0"/>
+        </a:xfrm>
+      </p:grpSpPr>
+      <p:sp>
+        <p:nvSpPr>
+          <p:cNvPr id="2" name="Title 1">
+            <a:extLst>
+              <a:ext uri="{FF2B5EF4-FFF2-40B4-BE49-F238E27FC236}">
+                <a16:creationId xmlns:a16="http://schemas.microsoft.com/office/drawing/2014/main" id="{FA8A84ED-08C9-EC4A-8078-BEFF32764DDE}"/>
+              </a:ext>
+            </a:extLst>
+          </p:cNvPr>
+          <p:cNvSpPr>
+            <a:spLocks noGrp="1"/>
+          </p:cNvSpPr>
+          <p:nvPr>
+            <p:ph type="title"/>
+          </p:nvPr>
+        </p:nvSpPr>
+        <p:spPr/>
+        <p:txBody>
+          <a:bodyPr/>
+          <a:lstStyle/>
+          <a:p>
+            <a:r>
+              <a:rPr lang="en-GB" dirty="0" err="1"/>
+              <a:t>Betingelser</a:t>
+            </a:r>
+            <a:endParaRPr lang="en-GB" dirty="0"/>
+          </a:p>
+        </p:txBody>
+      </p:sp>
+      <p:pic>
+        <p:nvPicPr>
+          <p:cNvPr id="5" name="Content Placeholder 4">
+            <a:extLst>
+              <a:ext uri="{FF2B5EF4-FFF2-40B4-BE49-F238E27FC236}">
+                <a16:creationId xmlns:a16="http://schemas.microsoft.com/office/drawing/2014/main" id="{87235312-F3A4-4E44-841D-CC127F128714}"/>
+              </a:ext>
+            </a:extLst>
+          </p:cNvPr>
+          <p:cNvPicPr>
+            <a:picLocks noGrp="1" noChangeAspect="1"/>
+          </p:cNvPicPr>
+          <p:nvPr>
+            <p:ph idx="1"/>
+          </p:nvPr>
+        </p:nvPicPr>
+        <p:blipFill>
+          <a:blip r:embed="rId2"/>
+          <a:stretch>
+            <a:fillRect/>
+          </a:stretch>
+        </p:blipFill>
+        <p:spPr>
+          <a:xfrm>
+            <a:off x="1311656" y="2372138"/>
+            <a:ext cx="1778000" cy="1905000"/>
+          </a:xfrm>
+        </p:spPr>
+      </p:pic>
+      <p:sp>
+        <p:nvSpPr>
+          <p:cNvPr id="6" name="Content Placeholder 2">
+            <a:extLst>
+              <a:ext uri="{FF2B5EF4-FFF2-40B4-BE49-F238E27FC236}">
+                <a16:creationId xmlns:a16="http://schemas.microsoft.com/office/drawing/2014/main" id="{5F758955-5CEB-A044-9283-15D7CEA92C60}"/>
+              </a:ext>
+            </a:extLst>
+          </p:cNvPr>
+          <p:cNvSpPr txBox="1">
+            <a:spLocks/>
+          </p:cNvSpPr>
+          <p:nvPr/>
+        </p:nvSpPr>
+        <p:spPr>
+          <a:xfrm>
+            <a:off x="8812729" y="1965573"/>
+            <a:ext cx="2957866" cy="3392812"/>
+          </a:xfrm>
+          <a:prstGeom prst="rect">
+            <a:avLst/>
+          </a:prstGeom>
+        </p:spPr>
+        <p:txBody>
+          <a:bodyPr vert="horz" lIns="91440" tIns="45720" rIns="91440" bIns="45720" rtlCol="0">
+            <a:noAutofit/>
+          </a:bodyPr>
+          <a:lstStyle>
+            <a:lvl1pPr marL="228600" indent="-228600" algn="l" defTabSz="914400" rtl="0" eaLnBrk="1" latinLnBrk="0" hangingPunct="1">
+              <a:lnSpc>
+                <a:spcPct val="90000"/>
+              </a:lnSpc>
+              <a:spcBef>
+                <a:spcPts val="1000"/>
+              </a:spcBef>
+              <a:buFont typeface="Arial" panose="020B0604020202020204" pitchFamily="34" charset="0"/>
+              <a:buChar char="•"/>
+              <a:defRPr sz="2800" kern="1200">
+                <a:solidFill>
+                  <a:schemeClr val="tx1"/>
+                </a:solidFill>
+                <a:latin typeface="+mn-lt"/>
+                <a:ea typeface="+mn-ea"/>
+                <a:cs typeface="+mn-cs"/>
+              </a:defRPr>
+            </a:lvl1pPr>
+            <a:lvl2pPr marL="685800" indent="-228600" algn="l" defTabSz="914400" rtl="0" eaLnBrk="1" latinLnBrk="0" hangingPunct="1">
+              <a:lnSpc>
+                <a:spcPct val="90000"/>
+              </a:lnSpc>
+              <a:spcBef>
+                <a:spcPts val="500"/>
+              </a:spcBef>
+              <a:buFont typeface="Arial" panose="020B0604020202020204" pitchFamily="34" charset="0"/>
+              <a:buChar char="•"/>
+              <a:defRPr sz="2400" kern="1200">
+                <a:solidFill>
+                  <a:schemeClr val="tx1"/>
+                </a:solidFill>
+                <a:latin typeface="+mn-lt"/>
+                <a:ea typeface="+mn-ea"/>
+                <a:cs typeface="+mn-cs"/>
+              </a:defRPr>
+            </a:lvl2pPr>
+            <a:lvl3pPr marL="1143000" indent="-228600" algn="l" defTabSz="914400" rtl="0" eaLnBrk="1" latinLnBrk="0" hangingPunct="1">
+              <a:lnSpc>
+                <a:spcPct val="90000"/>
+              </a:lnSpc>
+              <a:spcBef>
+                <a:spcPts val="500"/>
+              </a:spcBef>
+              <a:buFont typeface="Arial" panose="020B0604020202020204" pitchFamily="34" charset="0"/>
+              <a:buChar char="•"/>
+              <a:defRPr sz="2000" kern="1200">
+                <a:solidFill>
+                  <a:schemeClr val="tx1"/>
+                </a:solidFill>
+                <a:latin typeface="+mn-lt"/>
+                <a:ea typeface="+mn-ea"/>
+                <a:cs typeface="+mn-cs"/>
+              </a:defRPr>
+            </a:lvl3pPr>
+            <a:lvl4pPr marL="1600200" indent="-228600" algn="l" defTabSz="914400" rtl="0" eaLnBrk="1" latinLnBrk="0" hangingPunct="1">
+              <a:lnSpc>
+                <a:spcPct val="90000"/>
+              </a:lnSpc>
+              <a:spcBef>
+                <a:spcPts val="500"/>
+              </a:spcBef>
+              <a:buFont typeface="Arial" panose="020B0604020202020204" pitchFamily="34" charset="0"/>
+              <a:buChar char="•"/>
+              <a:defRPr sz="1800" kern="1200">
+                <a:solidFill>
+                  <a:schemeClr val="tx1"/>
+                </a:solidFill>
+                <a:latin typeface="+mn-lt"/>
+                <a:ea typeface="+mn-ea"/>
+                <a:cs typeface="+mn-cs"/>
+              </a:defRPr>
+            </a:lvl4pPr>
+            <a:lvl5pPr marL="2057400" indent="-228600" algn="l" defTabSz="914400" rtl="0" eaLnBrk="1" latinLnBrk="0" hangingPunct="1">
+              <a:lnSpc>
+                <a:spcPct val="90000"/>
+              </a:lnSpc>
+              <a:spcBef>
+                <a:spcPts val="500"/>
+              </a:spcBef>
+              <a:buFont typeface="Arial" panose="020B0604020202020204" pitchFamily="34" charset="0"/>
+              <a:buChar char="•"/>
+              <a:defRPr sz="1800" kern="1200">
+                <a:solidFill>
+                  <a:schemeClr val="tx1"/>
+                </a:solidFill>
+                <a:latin typeface="+mn-lt"/>
+                <a:ea typeface="+mn-ea"/>
+                <a:cs typeface="+mn-cs"/>
+              </a:defRPr>
+            </a:lvl5pPr>
+            <a:lvl6pPr marL="2514600" indent="-228600" algn="l" defTabSz="914400" rtl="0" eaLnBrk="1" latinLnBrk="0" hangingPunct="1">
+              <a:lnSpc>
+                <a:spcPct val="90000"/>
+              </a:lnSpc>
+              <a:spcBef>
+                <a:spcPts val="500"/>
+              </a:spcBef>
+              <a:buFont typeface="Arial" panose="020B0604020202020204" pitchFamily="34" charset="0"/>
+              <a:buChar char="•"/>
+              <a:defRPr sz="1800" kern="1200">
+                <a:solidFill>
+                  <a:schemeClr val="tx1"/>
+                </a:solidFill>
+                <a:latin typeface="+mn-lt"/>
+                <a:ea typeface="+mn-ea"/>
+                <a:cs typeface="+mn-cs"/>
+              </a:defRPr>
+            </a:lvl6pPr>
+            <a:lvl7pPr marL="2971800" indent="-228600" algn="l" defTabSz="914400" rtl="0" eaLnBrk="1" latinLnBrk="0" hangingPunct="1">
+              <a:lnSpc>
+                <a:spcPct val="90000"/>
+              </a:lnSpc>
+              <a:spcBef>
+                <a:spcPts val="500"/>
+              </a:spcBef>
+              <a:buFont typeface="Arial" panose="020B0604020202020204" pitchFamily="34" charset="0"/>
+              <a:buChar char="•"/>
+              <a:defRPr sz="1800" kern="1200">
+                <a:solidFill>
+                  <a:schemeClr val="tx1"/>
+                </a:solidFill>
+                <a:latin typeface="+mn-lt"/>
+                <a:ea typeface="+mn-ea"/>
+                <a:cs typeface="+mn-cs"/>
+              </a:defRPr>
+            </a:lvl7pPr>
+            <a:lvl8pPr marL="3429000" indent="-228600" algn="l" defTabSz="914400" rtl="0" eaLnBrk="1" latinLnBrk="0" hangingPunct="1">
+              <a:lnSpc>
+                <a:spcPct val="90000"/>
+              </a:lnSpc>
+              <a:spcBef>
+                <a:spcPts val="500"/>
+              </a:spcBef>
+              <a:buFont typeface="Arial" panose="020B0604020202020204" pitchFamily="34" charset="0"/>
+              <a:buChar char="•"/>
+              <a:defRPr sz="1800" kern="1200">
+                <a:solidFill>
+                  <a:schemeClr val="tx1"/>
+                </a:solidFill>
+                <a:latin typeface="+mn-lt"/>
+                <a:ea typeface="+mn-ea"/>
+                <a:cs typeface="+mn-cs"/>
+              </a:defRPr>
+            </a:lvl8pPr>
+            <a:lvl9pPr marL="3886200" indent="-228600" algn="l" defTabSz="914400" rtl="0" eaLnBrk="1" latinLnBrk="0" hangingPunct="1">
+              <a:lnSpc>
+                <a:spcPct val="90000"/>
+              </a:lnSpc>
+              <a:spcBef>
+                <a:spcPts val="500"/>
+              </a:spcBef>
+              <a:buFont typeface="Arial" panose="020B0604020202020204" pitchFamily="34" charset="0"/>
+              <a:buChar char="•"/>
+              <a:defRPr sz="1800" kern="1200">
+                <a:solidFill>
+                  <a:schemeClr val="tx1"/>
+                </a:solidFill>
+                <a:latin typeface="+mn-lt"/>
+                <a:ea typeface="+mn-ea"/>
+                <a:cs typeface="+mn-cs"/>
+              </a:defRPr>
+            </a:lvl9pPr>
+          </a:lstStyle>
+          <a:p>
+            <a:pPr marL="0" indent="0">
+              <a:lnSpc>
+                <a:spcPct val="100000"/>
+              </a:lnSpc>
+              <a:buNone/>
+            </a:pPr>
+            <a:r>
+              <a:rPr lang="en-GB" sz="1600" dirty="0">
+                <a:latin typeface="DejaVu Sans Book" panose="020B0603030804020204" pitchFamily="34" charset="0"/>
+                <a:ea typeface="DejaVu Sans Book" panose="020B0603030804020204" pitchFamily="34" charset="0"/>
+                <a:cs typeface="DejaVu Sans Book" panose="020B0603030804020204" pitchFamily="34" charset="0"/>
+              </a:rPr>
+              <a:t>&gt; let </a:t>
+            </a:r>
+            <a:r>
+              <a:rPr lang="en-GB" sz="1600" dirty="0" err="1">
+                <a:latin typeface="DejaVu Sans Book" panose="020B0603030804020204" pitchFamily="34" charset="0"/>
+                <a:ea typeface="DejaVu Sans Book" panose="020B0603030804020204" pitchFamily="34" charset="0"/>
+                <a:cs typeface="DejaVu Sans Book" panose="020B0603030804020204" pitchFamily="34" charset="0"/>
+              </a:rPr>
+              <a:t>str</a:t>
+            </a:r>
+            <a:r>
+              <a:rPr lang="en-GB" sz="1600" dirty="0">
+                <a:latin typeface="DejaVu Sans Book" panose="020B0603030804020204" pitchFamily="34" charset="0"/>
+                <a:ea typeface="DejaVu Sans Book" panose="020B0603030804020204" pitchFamily="34" charset="0"/>
+                <a:cs typeface="DejaVu Sans Book" panose="020B0603030804020204" pitchFamily="34" charset="0"/>
+              </a:rPr>
+              <a:t> =</a:t>
+            </a:r>
+          </a:p>
+          <a:p>
+            <a:pPr marL="0" indent="0">
+              <a:lnSpc>
+                <a:spcPct val="100000"/>
+              </a:lnSpc>
+              <a:buNone/>
+            </a:pPr>
+            <a:r>
+              <a:rPr lang="en-GB" sz="1600" dirty="0">
+                <a:latin typeface="DejaVu Sans Book" panose="020B0603030804020204" pitchFamily="34" charset="0"/>
+                <a:ea typeface="DejaVu Sans Book" panose="020B0603030804020204" pitchFamily="34" charset="0"/>
+                <a:cs typeface="DejaVu Sans Book" panose="020B0603030804020204" pitchFamily="34" charset="0"/>
+              </a:rPr>
+              <a:t>-   if 3 &lt; 2 then</a:t>
+            </a:r>
+          </a:p>
+          <a:p>
+            <a:pPr marL="0" indent="0">
+              <a:lnSpc>
+                <a:spcPct val="100000"/>
+              </a:lnSpc>
+              <a:buNone/>
+            </a:pPr>
+            <a:r>
+              <a:rPr lang="en-GB" sz="1600" dirty="0">
+                <a:latin typeface="DejaVu Sans Book" panose="020B0603030804020204" pitchFamily="34" charset="0"/>
+                <a:ea typeface="DejaVu Sans Book" panose="020B0603030804020204" pitchFamily="34" charset="0"/>
+                <a:cs typeface="DejaVu Sans Book" panose="020B0603030804020204" pitchFamily="34" charset="0"/>
+              </a:rPr>
+              <a:t>-     "3 &lt; 2"</a:t>
+            </a:r>
+          </a:p>
+          <a:p>
+            <a:pPr marL="0" indent="0">
+              <a:lnSpc>
+                <a:spcPct val="100000"/>
+              </a:lnSpc>
+              <a:buNone/>
+            </a:pPr>
+            <a:r>
+              <a:rPr lang="en-GB" sz="1600" dirty="0">
+                <a:latin typeface="DejaVu Sans Book" panose="020B0603030804020204" pitchFamily="34" charset="0"/>
+                <a:ea typeface="DejaVu Sans Book" panose="020B0603030804020204" pitchFamily="34" charset="0"/>
+                <a:cs typeface="DejaVu Sans Book" panose="020B0603030804020204" pitchFamily="34" charset="0"/>
+              </a:rPr>
+              <a:t>-   </a:t>
+            </a:r>
+            <a:r>
+              <a:rPr lang="en-GB" sz="1600" dirty="0" err="1">
+                <a:latin typeface="DejaVu Sans Book" panose="020B0603030804020204" pitchFamily="34" charset="0"/>
+                <a:ea typeface="DejaVu Sans Book" panose="020B0603030804020204" pitchFamily="34" charset="0"/>
+                <a:cs typeface="DejaVu Sans Book" panose="020B0603030804020204" pitchFamily="34" charset="0"/>
+              </a:rPr>
+              <a:t>elif</a:t>
+            </a:r>
+            <a:r>
+              <a:rPr lang="en-GB" sz="1600" dirty="0">
+                <a:latin typeface="DejaVu Sans Book" panose="020B0603030804020204" pitchFamily="34" charset="0"/>
+                <a:ea typeface="DejaVu Sans Book" panose="020B0603030804020204" pitchFamily="34" charset="0"/>
+                <a:cs typeface="DejaVu Sans Book" panose="020B0603030804020204" pitchFamily="34" charset="0"/>
+              </a:rPr>
+              <a:t> 3 = 2 then</a:t>
+            </a:r>
+          </a:p>
+          <a:p>
+            <a:pPr marL="0" indent="0">
+              <a:lnSpc>
+                <a:spcPct val="100000"/>
+              </a:lnSpc>
+              <a:buNone/>
+            </a:pPr>
+            <a:r>
+              <a:rPr lang="en-GB" sz="1600" dirty="0">
+                <a:latin typeface="DejaVu Sans Book" panose="020B0603030804020204" pitchFamily="34" charset="0"/>
+                <a:ea typeface="DejaVu Sans Book" panose="020B0603030804020204" pitchFamily="34" charset="0"/>
+                <a:cs typeface="DejaVu Sans Book" panose="020B0603030804020204" pitchFamily="34" charset="0"/>
+              </a:rPr>
+              <a:t>-     "3 = 2"</a:t>
+            </a:r>
+          </a:p>
+          <a:p>
+            <a:pPr marL="0" indent="0">
+              <a:lnSpc>
+                <a:spcPct val="100000"/>
+              </a:lnSpc>
+              <a:buNone/>
+            </a:pPr>
+            <a:r>
+              <a:rPr lang="en-GB" sz="1600" dirty="0">
+                <a:latin typeface="DejaVu Sans Book" panose="020B0603030804020204" pitchFamily="34" charset="0"/>
+                <a:ea typeface="DejaVu Sans Book" panose="020B0603030804020204" pitchFamily="34" charset="0"/>
+                <a:cs typeface="DejaVu Sans Book" panose="020B0603030804020204" pitchFamily="34" charset="0"/>
+              </a:rPr>
+              <a:t>-   else</a:t>
+            </a:r>
+          </a:p>
+          <a:p>
+            <a:pPr marL="0" indent="0">
+              <a:lnSpc>
+                <a:spcPct val="100000"/>
+              </a:lnSpc>
+              <a:buNone/>
+            </a:pPr>
+            <a:r>
+              <a:rPr lang="en-GB" sz="1600" dirty="0">
+                <a:latin typeface="DejaVu Sans Book" panose="020B0603030804020204" pitchFamily="34" charset="0"/>
+                <a:ea typeface="DejaVu Sans Book" panose="020B0603030804020204" pitchFamily="34" charset="0"/>
+                <a:cs typeface="DejaVu Sans Book" panose="020B0603030804020204" pitchFamily="34" charset="0"/>
+              </a:rPr>
+              <a:t>-     "3 &gt; 2";;</a:t>
+            </a:r>
+          </a:p>
+          <a:p>
+            <a:pPr marL="0" indent="0">
+              <a:lnSpc>
+                <a:spcPct val="100000"/>
+              </a:lnSpc>
+              <a:buNone/>
+            </a:pPr>
+            <a:r>
+              <a:rPr lang="en-GB" sz="1600" dirty="0" err="1">
+                <a:latin typeface="DejaVu Sans Book" panose="020B0603030804020204" pitchFamily="34" charset="0"/>
+                <a:ea typeface="DejaVu Sans Book" panose="020B0603030804020204" pitchFamily="34" charset="0"/>
+                <a:cs typeface="DejaVu Sans Book" panose="020B0603030804020204" pitchFamily="34" charset="0"/>
+              </a:rPr>
+              <a:t>val</a:t>
+            </a:r>
+            <a:r>
+              <a:rPr lang="en-GB" sz="1600" dirty="0">
+                <a:latin typeface="DejaVu Sans Book" panose="020B0603030804020204" pitchFamily="34" charset="0"/>
+                <a:ea typeface="DejaVu Sans Book" panose="020B0603030804020204" pitchFamily="34" charset="0"/>
+                <a:cs typeface="DejaVu Sans Book" panose="020B0603030804020204" pitchFamily="34" charset="0"/>
+              </a:rPr>
+              <a:t> </a:t>
+            </a:r>
+            <a:r>
+              <a:rPr lang="en-GB" sz="1600" dirty="0" err="1">
+                <a:latin typeface="DejaVu Sans Book" panose="020B0603030804020204" pitchFamily="34" charset="0"/>
+                <a:ea typeface="DejaVu Sans Book" panose="020B0603030804020204" pitchFamily="34" charset="0"/>
+                <a:cs typeface="DejaVu Sans Book" panose="020B0603030804020204" pitchFamily="34" charset="0"/>
+              </a:rPr>
+              <a:t>str</a:t>
+            </a:r>
+            <a:r>
+              <a:rPr lang="en-GB" sz="1600" dirty="0">
+                <a:latin typeface="DejaVu Sans Book" panose="020B0603030804020204" pitchFamily="34" charset="0"/>
+                <a:ea typeface="DejaVu Sans Book" panose="020B0603030804020204" pitchFamily="34" charset="0"/>
+                <a:cs typeface="DejaVu Sans Book" panose="020B0603030804020204" pitchFamily="34" charset="0"/>
+              </a:rPr>
+              <a:t> : string = "3 &gt; 2"</a:t>
+            </a:r>
+          </a:p>
+        </p:txBody>
+      </p:sp>
+      <p:cxnSp>
+        <p:nvCxnSpPr>
+          <p:cNvPr id="7" name="Straight Connector 6">
+            <a:extLst>
+              <a:ext uri="{FF2B5EF4-FFF2-40B4-BE49-F238E27FC236}">
+                <a16:creationId xmlns:a16="http://schemas.microsoft.com/office/drawing/2014/main" id="{1CAA9C42-779C-4D41-8F0B-22F3E683BF09}"/>
+              </a:ext>
+            </a:extLst>
+          </p:cNvPr>
+          <p:cNvCxnSpPr>
+            <a:cxnSpLocks/>
+          </p:cNvCxnSpPr>
+          <p:nvPr/>
+        </p:nvCxnSpPr>
+        <p:spPr>
+          <a:xfrm>
+            <a:off x="8208354" y="1215766"/>
+            <a:ext cx="0" cy="5260571"/>
+          </a:xfrm>
+          <a:prstGeom prst="line">
+            <a:avLst/>
+          </a:prstGeom>
+        </p:spPr>
+        <p:style>
+          <a:lnRef idx="1">
+            <a:schemeClr val="accent1"/>
+          </a:lnRef>
+          <a:fillRef idx="0">
+            <a:schemeClr val="accent1"/>
+          </a:fillRef>
+          <a:effectRef idx="0">
+            <a:schemeClr val="accent1"/>
+          </a:effectRef>
+          <a:fontRef idx="minor">
+            <a:schemeClr val="tx1"/>
+          </a:fontRef>
+        </p:style>
+      </p:cxnSp>
+      <p:sp>
+        <p:nvSpPr>
+          <p:cNvPr id="8" name="TextBox 7">
+            <a:extLst>
+              <a:ext uri="{FF2B5EF4-FFF2-40B4-BE49-F238E27FC236}">
+                <a16:creationId xmlns:a16="http://schemas.microsoft.com/office/drawing/2014/main" id="{008F05D8-1C88-724C-B55A-99C8462C11F4}"/>
+              </a:ext>
+            </a:extLst>
+          </p:cNvPr>
+          <p:cNvSpPr txBox="1"/>
+          <p:nvPr/>
+        </p:nvSpPr>
+        <p:spPr>
+          <a:xfrm>
+            <a:off x="8525869" y="1328232"/>
+            <a:ext cx="2667782" cy="461665"/>
+          </a:xfrm>
+          <a:prstGeom prst="rect">
+            <a:avLst/>
+          </a:prstGeom>
+          <a:noFill/>
+        </p:spPr>
+        <p:txBody>
+          <a:bodyPr wrap="none" rtlCol="0">
+            <a:spAutoFit/>
+          </a:bodyPr>
+          <a:lstStyle/>
+          <a:p>
+            <a:r>
+              <a:rPr lang="en-GB" sz="2400" dirty="0" err="1"/>
+              <a:t>Kæde</a:t>
+            </a:r>
+            <a:r>
+              <a:rPr lang="en-GB" sz="2400" dirty="0"/>
+              <a:t> </a:t>
+            </a:r>
+            <a:r>
+              <a:rPr lang="en-GB" sz="2400" dirty="0" err="1"/>
+              <a:t>af</a:t>
+            </a:r>
+            <a:r>
+              <a:rPr lang="en-GB" sz="2400" dirty="0"/>
+              <a:t> </a:t>
+            </a:r>
+            <a:r>
+              <a:rPr lang="en-GB" sz="2400" dirty="0" err="1"/>
+              <a:t>betingelser</a:t>
+            </a:r>
+            <a:endParaRPr lang="en-GB" sz="2400" dirty="0"/>
+          </a:p>
+        </p:txBody>
+      </p:sp>
+      <p:sp>
+        <p:nvSpPr>
+          <p:cNvPr id="9" name="Content Placeholder 2">
+            <a:extLst>
+              <a:ext uri="{FF2B5EF4-FFF2-40B4-BE49-F238E27FC236}">
+                <a16:creationId xmlns:a16="http://schemas.microsoft.com/office/drawing/2014/main" id="{445F9F68-01BF-6741-B548-46BBF40CF19E}"/>
+              </a:ext>
+            </a:extLst>
+          </p:cNvPr>
+          <p:cNvSpPr txBox="1">
+            <a:spLocks/>
+          </p:cNvSpPr>
+          <p:nvPr/>
+        </p:nvSpPr>
+        <p:spPr>
+          <a:xfrm>
+            <a:off x="4646113" y="1800981"/>
+            <a:ext cx="2541071" cy="2225250"/>
+          </a:xfrm>
+          <a:prstGeom prst="rect">
+            <a:avLst/>
+          </a:prstGeom>
+        </p:spPr>
+        <p:txBody>
+          <a:bodyPr vert="horz" lIns="91440" tIns="45720" rIns="91440" bIns="45720" rtlCol="0">
+            <a:noAutofit/>
+          </a:bodyPr>
+          <a:lstStyle>
+            <a:lvl1pPr marL="228600" indent="-228600" algn="l" defTabSz="914400" rtl="0" eaLnBrk="1" latinLnBrk="0" hangingPunct="1">
+              <a:lnSpc>
+                <a:spcPct val="90000"/>
+              </a:lnSpc>
+              <a:spcBef>
+                <a:spcPts val="1000"/>
+              </a:spcBef>
+              <a:buFont typeface="Arial" panose="020B0604020202020204" pitchFamily="34" charset="0"/>
+              <a:buChar char="•"/>
+              <a:defRPr sz="2800" kern="1200">
+                <a:solidFill>
+                  <a:schemeClr val="tx1"/>
+                </a:solidFill>
+                <a:latin typeface="+mn-lt"/>
+                <a:ea typeface="+mn-ea"/>
+                <a:cs typeface="+mn-cs"/>
+              </a:defRPr>
+            </a:lvl1pPr>
+            <a:lvl2pPr marL="685800" indent="-228600" algn="l" defTabSz="914400" rtl="0" eaLnBrk="1" latinLnBrk="0" hangingPunct="1">
+              <a:lnSpc>
+                <a:spcPct val="90000"/>
+              </a:lnSpc>
+              <a:spcBef>
+                <a:spcPts val="500"/>
+              </a:spcBef>
+              <a:buFont typeface="Arial" panose="020B0604020202020204" pitchFamily="34" charset="0"/>
+              <a:buChar char="•"/>
+              <a:defRPr sz="2400" kern="1200">
+                <a:solidFill>
+                  <a:schemeClr val="tx1"/>
+                </a:solidFill>
+                <a:latin typeface="+mn-lt"/>
+                <a:ea typeface="+mn-ea"/>
+                <a:cs typeface="+mn-cs"/>
+              </a:defRPr>
+            </a:lvl2pPr>
+            <a:lvl3pPr marL="1143000" indent="-228600" algn="l" defTabSz="914400" rtl="0" eaLnBrk="1" latinLnBrk="0" hangingPunct="1">
+              <a:lnSpc>
+                <a:spcPct val="90000"/>
+              </a:lnSpc>
+              <a:spcBef>
+                <a:spcPts val="500"/>
+              </a:spcBef>
+              <a:buFont typeface="Arial" panose="020B0604020202020204" pitchFamily="34" charset="0"/>
+              <a:buChar char="•"/>
+              <a:defRPr sz="2000" kern="1200">
+                <a:solidFill>
+                  <a:schemeClr val="tx1"/>
+                </a:solidFill>
+                <a:latin typeface="+mn-lt"/>
+                <a:ea typeface="+mn-ea"/>
+                <a:cs typeface="+mn-cs"/>
+              </a:defRPr>
+            </a:lvl3pPr>
+            <a:lvl4pPr marL="1600200" indent="-228600" algn="l" defTabSz="914400" rtl="0" eaLnBrk="1" latinLnBrk="0" hangingPunct="1">
+              <a:lnSpc>
+                <a:spcPct val="90000"/>
+              </a:lnSpc>
+              <a:spcBef>
+                <a:spcPts val="500"/>
+              </a:spcBef>
+              <a:buFont typeface="Arial" panose="020B0604020202020204" pitchFamily="34" charset="0"/>
+              <a:buChar char="•"/>
+              <a:defRPr sz="1800" kern="1200">
+                <a:solidFill>
+                  <a:schemeClr val="tx1"/>
+                </a:solidFill>
+                <a:latin typeface="+mn-lt"/>
+                <a:ea typeface="+mn-ea"/>
+                <a:cs typeface="+mn-cs"/>
+              </a:defRPr>
+            </a:lvl4pPr>
+            <a:lvl5pPr marL="2057400" indent="-228600" algn="l" defTabSz="914400" rtl="0" eaLnBrk="1" latinLnBrk="0" hangingPunct="1">
+              <a:lnSpc>
+                <a:spcPct val="90000"/>
+              </a:lnSpc>
+              <a:spcBef>
+                <a:spcPts val="500"/>
+              </a:spcBef>
+              <a:buFont typeface="Arial" panose="020B0604020202020204" pitchFamily="34" charset="0"/>
+              <a:buChar char="•"/>
+              <a:defRPr sz="1800" kern="1200">
+                <a:solidFill>
+                  <a:schemeClr val="tx1"/>
+                </a:solidFill>
+                <a:latin typeface="+mn-lt"/>
+                <a:ea typeface="+mn-ea"/>
+                <a:cs typeface="+mn-cs"/>
+              </a:defRPr>
+            </a:lvl5pPr>
+            <a:lvl6pPr marL="2514600" indent="-228600" algn="l" defTabSz="914400" rtl="0" eaLnBrk="1" latinLnBrk="0" hangingPunct="1">
+              <a:lnSpc>
+                <a:spcPct val="90000"/>
+              </a:lnSpc>
+              <a:spcBef>
+                <a:spcPts val="500"/>
+              </a:spcBef>
+              <a:buFont typeface="Arial" panose="020B0604020202020204" pitchFamily="34" charset="0"/>
+              <a:buChar char="•"/>
+              <a:defRPr sz="1800" kern="1200">
+                <a:solidFill>
+                  <a:schemeClr val="tx1"/>
+                </a:solidFill>
+                <a:latin typeface="+mn-lt"/>
+                <a:ea typeface="+mn-ea"/>
+                <a:cs typeface="+mn-cs"/>
+              </a:defRPr>
+            </a:lvl6pPr>
+            <a:lvl7pPr marL="2971800" indent="-228600" algn="l" defTabSz="914400" rtl="0" eaLnBrk="1" latinLnBrk="0" hangingPunct="1">
+              <a:lnSpc>
+                <a:spcPct val="90000"/>
+              </a:lnSpc>
+              <a:spcBef>
+                <a:spcPts val="500"/>
+              </a:spcBef>
+              <a:buFont typeface="Arial" panose="020B0604020202020204" pitchFamily="34" charset="0"/>
+              <a:buChar char="•"/>
+              <a:defRPr sz="1800" kern="1200">
+                <a:solidFill>
+                  <a:schemeClr val="tx1"/>
+                </a:solidFill>
+                <a:latin typeface="+mn-lt"/>
+                <a:ea typeface="+mn-ea"/>
+                <a:cs typeface="+mn-cs"/>
+              </a:defRPr>
+            </a:lvl7pPr>
+            <a:lvl8pPr marL="3429000" indent="-228600" algn="l" defTabSz="914400" rtl="0" eaLnBrk="1" latinLnBrk="0" hangingPunct="1">
+              <a:lnSpc>
+                <a:spcPct val="90000"/>
+              </a:lnSpc>
+              <a:spcBef>
+                <a:spcPts val="500"/>
+              </a:spcBef>
+              <a:buFont typeface="Arial" panose="020B0604020202020204" pitchFamily="34" charset="0"/>
+              <a:buChar char="•"/>
+              <a:defRPr sz="1800" kern="1200">
+                <a:solidFill>
+                  <a:schemeClr val="tx1"/>
+                </a:solidFill>
+                <a:latin typeface="+mn-lt"/>
+                <a:ea typeface="+mn-ea"/>
+                <a:cs typeface="+mn-cs"/>
+              </a:defRPr>
+            </a:lvl8pPr>
+            <a:lvl9pPr marL="3886200" indent="-228600" algn="l" defTabSz="914400" rtl="0" eaLnBrk="1" latinLnBrk="0" hangingPunct="1">
+              <a:lnSpc>
+                <a:spcPct val="90000"/>
+              </a:lnSpc>
+              <a:spcBef>
+                <a:spcPts val="500"/>
+              </a:spcBef>
+              <a:buFont typeface="Arial" panose="020B0604020202020204" pitchFamily="34" charset="0"/>
+              <a:buChar char="•"/>
+              <a:defRPr sz="1800" kern="1200">
+                <a:solidFill>
+                  <a:schemeClr val="tx1"/>
+                </a:solidFill>
+                <a:latin typeface="+mn-lt"/>
+                <a:ea typeface="+mn-ea"/>
+                <a:cs typeface="+mn-cs"/>
+              </a:defRPr>
+            </a:lvl9pPr>
+          </a:lstStyle>
+          <a:p>
+            <a:pPr marL="0" indent="0">
+              <a:lnSpc>
+                <a:spcPct val="100000"/>
+              </a:lnSpc>
+              <a:buNone/>
+            </a:pPr>
+            <a:r>
+              <a:rPr lang="en-GB" sz="1600" dirty="0">
+                <a:latin typeface="DejaVu Sans Book" panose="020B0603030804020204" pitchFamily="34" charset="0"/>
+                <a:ea typeface="DejaVu Sans Book" panose="020B0603030804020204" pitchFamily="34" charset="0"/>
+                <a:cs typeface="DejaVu Sans Book" panose="020B0603030804020204" pitchFamily="34" charset="0"/>
+              </a:rPr>
+              <a:t>&gt; if 3 &lt; 2 then       </a:t>
+            </a:r>
+          </a:p>
+          <a:p>
+            <a:pPr marL="0" indent="0">
+              <a:lnSpc>
+                <a:spcPct val="100000"/>
+              </a:lnSpc>
+              <a:buNone/>
+            </a:pPr>
+            <a:r>
+              <a:rPr lang="en-GB" sz="1600" dirty="0">
+                <a:latin typeface="DejaVu Sans Book" panose="020B0603030804020204" pitchFamily="34" charset="0"/>
+                <a:ea typeface="DejaVu Sans Book" panose="020B0603030804020204" pitchFamily="34" charset="0"/>
+                <a:cs typeface="DejaVu Sans Book" panose="020B0603030804020204" pitchFamily="34" charset="0"/>
+              </a:rPr>
+              <a:t>-   </a:t>
+            </a:r>
+            <a:r>
+              <a:rPr lang="en-GB" sz="1600" dirty="0" err="1">
+                <a:latin typeface="DejaVu Sans Book" panose="020B0603030804020204" pitchFamily="34" charset="0"/>
+                <a:ea typeface="DejaVu Sans Book" panose="020B0603030804020204" pitchFamily="34" charset="0"/>
+                <a:cs typeface="DejaVu Sans Book" panose="020B0603030804020204" pitchFamily="34" charset="0"/>
+              </a:rPr>
+              <a:t>printfn</a:t>
+            </a:r>
+            <a:r>
+              <a:rPr lang="en-GB" sz="1600" dirty="0">
+                <a:latin typeface="DejaVu Sans Book" panose="020B0603030804020204" pitchFamily="34" charset="0"/>
+                <a:ea typeface="DejaVu Sans Book" panose="020B0603030804020204" pitchFamily="34" charset="0"/>
+                <a:cs typeface="DejaVu Sans Book" panose="020B0603030804020204" pitchFamily="34" charset="0"/>
+              </a:rPr>
+              <a:t> "3 &lt; 2"   </a:t>
+            </a:r>
+          </a:p>
+          <a:p>
+            <a:pPr marL="0" indent="0">
+              <a:lnSpc>
+                <a:spcPct val="100000"/>
+              </a:lnSpc>
+              <a:buNone/>
+            </a:pPr>
+            <a:r>
+              <a:rPr lang="en-GB" sz="1600" dirty="0">
+                <a:latin typeface="DejaVu Sans Book" panose="020B0603030804020204" pitchFamily="34" charset="0"/>
+                <a:ea typeface="DejaVu Sans Book" panose="020B0603030804020204" pitchFamily="34" charset="0"/>
+                <a:cs typeface="DejaVu Sans Book" panose="020B0603030804020204" pitchFamily="34" charset="0"/>
+              </a:rPr>
+              <a:t>- else                </a:t>
+            </a:r>
+          </a:p>
+          <a:p>
+            <a:pPr marL="0" indent="0">
+              <a:lnSpc>
+                <a:spcPct val="100000"/>
+              </a:lnSpc>
+              <a:buNone/>
+            </a:pPr>
+            <a:r>
+              <a:rPr lang="en-GB" sz="1600" dirty="0">
+                <a:latin typeface="DejaVu Sans Book" panose="020B0603030804020204" pitchFamily="34" charset="0"/>
+                <a:ea typeface="DejaVu Sans Book" panose="020B0603030804020204" pitchFamily="34" charset="0"/>
+                <a:cs typeface="DejaVu Sans Book" panose="020B0603030804020204" pitchFamily="34" charset="0"/>
+              </a:rPr>
+              <a:t>-   </a:t>
+            </a:r>
+            <a:r>
+              <a:rPr lang="en-GB" sz="1600" dirty="0" err="1">
+                <a:latin typeface="DejaVu Sans Book" panose="020B0603030804020204" pitchFamily="34" charset="0"/>
+                <a:ea typeface="DejaVu Sans Book" panose="020B0603030804020204" pitchFamily="34" charset="0"/>
+                <a:cs typeface="DejaVu Sans Book" panose="020B0603030804020204" pitchFamily="34" charset="0"/>
+              </a:rPr>
+              <a:t>printfn</a:t>
+            </a:r>
+            <a:r>
+              <a:rPr lang="en-GB" sz="1600" dirty="0">
+                <a:latin typeface="DejaVu Sans Book" panose="020B0603030804020204" pitchFamily="34" charset="0"/>
+                <a:ea typeface="DejaVu Sans Book" panose="020B0603030804020204" pitchFamily="34" charset="0"/>
+                <a:cs typeface="DejaVu Sans Book" panose="020B0603030804020204" pitchFamily="34" charset="0"/>
+              </a:rPr>
+              <a:t> "3 &gt;= 2";;</a:t>
+            </a:r>
+          </a:p>
+          <a:p>
+            <a:pPr marL="0" indent="0">
+              <a:lnSpc>
+                <a:spcPct val="100000"/>
+              </a:lnSpc>
+              <a:buNone/>
+            </a:pPr>
+            <a:r>
+              <a:rPr lang="en-GB" sz="1600" dirty="0">
+                <a:latin typeface="DejaVu Sans Book" panose="020B0603030804020204" pitchFamily="34" charset="0"/>
+                <a:ea typeface="DejaVu Sans Book" panose="020B0603030804020204" pitchFamily="34" charset="0"/>
+                <a:cs typeface="DejaVu Sans Book" panose="020B0603030804020204" pitchFamily="34" charset="0"/>
+              </a:rPr>
+              <a:t>3 &gt;= 2</a:t>
+            </a:r>
+          </a:p>
+          <a:p>
+            <a:pPr marL="0" indent="0">
+              <a:lnSpc>
+                <a:spcPct val="100000"/>
+              </a:lnSpc>
+              <a:buNone/>
+            </a:pPr>
+            <a:r>
+              <a:rPr lang="en-GB" sz="1600" dirty="0" err="1">
+                <a:latin typeface="DejaVu Sans Book" panose="020B0603030804020204" pitchFamily="34" charset="0"/>
+                <a:ea typeface="DejaVu Sans Book" panose="020B0603030804020204" pitchFamily="34" charset="0"/>
+                <a:cs typeface="DejaVu Sans Book" panose="020B0603030804020204" pitchFamily="34" charset="0"/>
+              </a:rPr>
+              <a:t>val</a:t>
+            </a:r>
+            <a:r>
+              <a:rPr lang="en-GB" sz="1600" dirty="0">
+                <a:latin typeface="DejaVu Sans Book" panose="020B0603030804020204" pitchFamily="34" charset="0"/>
+                <a:ea typeface="DejaVu Sans Book" panose="020B0603030804020204" pitchFamily="34" charset="0"/>
+                <a:cs typeface="DejaVu Sans Book" panose="020B0603030804020204" pitchFamily="34" charset="0"/>
+              </a:rPr>
+              <a:t> it : unit = ()</a:t>
+            </a:r>
+          </a:p>
+        </p:txBody>
+      </p:sp>
+      <p:cxnSp>
+        <p:nvCxnSpPr>
+          <p:cNvPr id="10" name="Straight Connector 9">
+            <a:extLst>
+              <a:ext uri="{FF2B5EF4-FFF2-40B4-BE49-F238E27FC236}">
+                <a16:creationId xmlns:a16="http://schemas.microsoft.com/office/drawing/2014/main" id="{4BA22578-D4F6-CC4B-B003-673CC66F18B3}"/>
+              </a:ext>
+            </a:extLst>
+          </p:cNvPr>
+          <p:cNvCxnSpPr>
+            <a:cxnSpLocks/>
+          </p:cNvCxnSpPr>
+          <p:nvPr/>
+        </p:nvCxnSpPr>
+        <p:spPr>
+          <a:xfrm>
+            <a:off x="4041738" y="1179190"/>
+            <a:ext cx="0" cy="5260571"/>
+          </a:xfrm>
+          <a:prstGeom prst="line">
+            <a:avLst/>
+          </a:prstGeom>
+        </p:spPr>
+        <p:style>
+          <a:lnRef idx="1">
+            <a:schemeClr val="accent1"/>
+          </a:lnRef>
+          <a:fillRef idx="0">
+            <a:schemeClr val="accent1"/>
+          </a:fillRef>
+          <a:effectRef idx="0">
+            <a:schemeClr val="accent1"/>
+          </a:effectRef>
+          <a:fontRef idx="minor">
+            <a:schemeClr val="tx1"/>
+          </a:fontRef>
+        </p:style>
+      </p:cxnSp>
+      <p:sp>
+        <p:nvSpPr>
+          <p:cNvPr id="11" name="TextBox 10">
+            <a:extLst>
+              <a:ext uri="{FF2B5EF4-FFF2-40B4-BE49-F238E27FC236}">
+                <a16:creationId xmlns:a16="http://schemas.microsoft.com/office/drawing/2014/main" id="{9EE123FE-C00C-844E-81A0-A07818ED05A8}"/>
+              </a:ext>
+            </a:extLst>
+          </p:cNvPr>
+          <p:cNvSpPr txBox="1"/>
+          <p:nvPr/>
+        </p:nvSpPr>
+        <p:spPr>
+          <a:xfrm>
+            <a:off x="4359253" y="1291656"/>
+            <a:ext cx="1615892" cy="461665"/>
+          </a:xfrm>
+          <a:prstGeom prst="rect">
+            <a:avLst/>
+          </a:prstGeom>
+          <a:noFill/>
+        </p:spPr>
+        <p:txBody>
+          <a:bodyPr wrap="none" rtlCol="0">
+            <a:spAutoFit/>
+          </a:bodyPr>
+          <a:lstStyle/>
+          <a:p>
+            <a:r>
+              <a:rPr lang="en-GB" sz="2400" dirty="0"/>
+              <a:t>If-then-else</a:t>
+            </a:r>
+          </a:p>
+        </p:txBody>
+      </p:sp>
+      <p:sp>
+        <p:nvSpPr>
+          <p:cNvPr id="12" name="Content Placeholder 2">
+            <a:extLst>
+              <a:ext uri="{FF2B5EF4-FFF2-40B4-BE49-F238E27FC236}">
+                <a16:creationId xmlns:a16="http://schemas.microsoft.com/office/drawing/2014/main" id="{799C16BE-621B-7645-BD01-AA8BD5034D93}"/>
+              </a:ext>
+            </a:extLst>
+          </p:cNvPr>
+          <p:cNvSpPr txBox="1">
+            <a:spLocks/>
+          </p:cNvSpPr>
+          <p:nvPr/>
+        </p:nvSpPr>
+        <p:spPr>
+          <a:xfrm>
+            <a:off x="4646112" y="4340561"/>
+            <a:ext cx="2957868" cy="2206543"/>
+          </a:xfrm>
+          <a:prstGeom prst="rect">
+            <a:avLst/>
+          </a:prstGeom>
+        </p:spPr>
+        <p:txBody>
+          <a:bodyPr vert="horz" lIns="91440" tIns="45720" rIns="91440" bIns="45720" rtlCol="0">
+            <a:noAutofit/>
+          </a:bodyPr>
+          <a:lstStyle>
+            <a:lvl1pPr marL="228600" indent="-228600" algn="l" defTabSz="914400" rtl="0" eaLnBrk="1" latinLnBrk="0" hangingPunct="1">
+              <a:lnSpc>
+                <a:spcPct val="90000"/>
+              </a:lnSpc>
+              <a:spcBef>
+                <a:spcPts val="1000"/>
+              </a:spcBef>
+              <a:buFont typeface="Arial" panose="020B0604020202020204" pitchFamily="34" charset="0"/>
+              <a:buChar char="•"/>
+              <a:defRPr sz="2800" kern="1200">
+                <a:solidFill>
+                  <a:schemeClr val="tx1"/>
+                </a:solidFill>
+                <a:latin typeface="+mn-lt"/>
+                <a:ea typeface="+mn-ea"/>
+                <a:cs typeface="+mn-cs"/>
+              </a:defRPr>
+            </a:lvl1pPr>
+            <a:lvl2pPr marL="685800" indent="-228600" algn="l" defTabSz="914400" rtl="0" eaLnBrk="1" latinLnBrk="0" hangingPunct="1">
+              <a:lnSpc>
+                <a:spcPct val="90000"/>
+              </a:lnSpc>
+              <a:spcBef>
+                <a:spcPts val="500"/>
+              </a:spcBef>
+              <a:buFont typeface="Arial" panose="020B0604020202020204" pitchFamily="34" charset="0"/>
+              <a:buChar char="•"/>
+              <a:defRPr sz="2400" kern="1200">
+                <a:solidFill>
+                  <a:schemeClr val="tx1"/>
+                </a:solidFill>
+                <a:latin typeface="+mn-lt"/>
+                <a:ea typeface="+mn-ea"/>
+                <a:cs typeface="+mn-cs"/>
+              </a:defRPr>
+            </a:lvl2pPr>
+            <a:lvl3pPr marL="1143000" indent="-228600" algn="l" defTabSz="914400" rtl="0" eaLnBrk="1" latinLnBrk="0" hangingPunct="1">
+              <a:lnSpc>
+                <a:spcPct val="90000"/>
+              </a:lnSpc>
+              <a:spcBef>
+                <a:spcPts val="500"/>
+              </a:spcBef>
+              <a:buFont typeface="Arial" panose="020B0604020202020204" pitchFamily="34" charset="0"/>
+              <a:buChar char="•"/>
+              <a:defRPr sz="2000" kern="1200">
+                <a:solidFill>
+                  <a:schemeClr val="tx1"/>
+                </a:solidFill>
+                <a:latin typeface="+mn-lt"/>
+                <a:ea typeface="+mn-ea"/>
+                <a:cs typeface="+mn-cs"/>
+              </a:defRPr>
+            </a:lvl3pPr>
+            <a:lvl4pPr marL="1600200" indent="-228600" algn="l" defTabSz="914400" rtl="0" eaLnBrk="1" latinLnBrk="0" hangingPunct="1">
+              <a:lnSpc>
+                <a:spcPct val="90000"/>
+              </a:lnSpc>
+              <a:spcBef>
+                <a:spcPts val="500"/>
+              </a:spcBef>
+              <a:buFont typeface="Arial" panose="020B0604020202020204" pitchFamily="34" charset="0"/>
+              <a:buChar char="•"/>
+              <a:defRPr sz="1800" kern="1200">
+                <a:solidFill>
+                  <a:schemeClr val="tx1"/>
+                </a:solidFill>
+                <a:latin typeface="+mn-lt"/>
+                <a:ea typeface="+mn-ea"/>
+                <a:cs typeface="+mn-cs"/>
+              </a:defRPr>
+            </a:lvl4pPr>
+            <a:lvl5pPr marL="2057400" indent="-228600" algn="l" defTabSz="914400" rtl="0" eaLnBrk="1" latinLnBrk="0" hangingPunct="1">
+              <a:lnSpc>
+                <a:spcPct val="90000"/>
+              </a:lnSpc>
+              <a:spcBef>
+                <a:spcPts val="500"/>
+              </a:spcBef>
+              <a:buFont typeface="Arial" panose="020B0604020202020204" pitchFamily="34" charset="0"/>
+              <a:buChar char="•"/>
+              <a:defRPr sz="1800" kern="1200">
+                <a:solidFill>
+                  <a:schemeClr val="tx1"/>
+                </a:solidFill>
+                <a:latin typeface="+mn-lt"/>
+                <a:ea typeface="+mn-ea"/>
+                <a:cs typeface="+mn-cs"/>
+              </a:defRPr>
+            </a:lvl5pPr>
+            <a:lvl6pPr marL="2514600" indent="-228600" algn="l" defTabSz="914400" rtl="0" eaLnBrk="1" latinLnBrk="0" hangingPunct="1">
+              <a:lnSpc>
+                <a:spcPct val="90000"/>
+              </a:lnSpc>
+              <a:spcBef>
+                <a:spcPts val="500"/>
+              </a:spcBef>
+              <a:buFont typeface="Arial" panose="020B0604020202020204" pitchFamily="34" charset="0"/>
+              <a:buChar char="•"/>
+              <a:defRPr sz="1800" kern="1200">
+                <a:solidFill>
+                  <a:schemeClr val="tx1"/>
+                </a:solidFill>
+                <a:latin typeface="+mn-lt"/>
+                <a:ea typeface="+mn-ea"/>
+                <a:cs typeface="+mn-cs"/>
+              </a:defRPr>
+            </a:lvl6pPr>
+            <a:lvl7pPr marL="2971800" indent="-228600" algn="l" defTabSz="914400" rtl="0" eaLnBrk="1" latinLnBrk="0" hangingPunct="1">
+              <a:lnSpc>
+                <a:spcPct val="90000"/>
+              </a:lnSpc>
+              <a:spcBef>
+                <a:spcPts val="500"/>
+              </a:spcBef>
+              <a:buFont typeface="Arial" panose="020B0604020202020204" pitchFamily="34" charset="0"/>
+              <a:buChar char="•"/>
+              <a:defRPr sz="1800" kern="1200">
+                <a:solidFill>
+                  <a:schemeClr val="tx1"/>
+                </a:solidFill>
+                <a:latin typeface="+mn-lt"/>
+                <a:ea typeface="+mn-ea"/>
+                <a:cs typeface="+mn-cs"/>
+              </a:defRPr>
+            </a:lvl7pPr>
+            <a:lvl8pPr marL="3429000" indent="-228600" algn="l" defTabSz="914400" rtl="0" eaLnBrk="1" latinLnBrk="0" hangingPunct="1">
+              <a:lnSpc>
+                <a:spcPct val="90000"/>
+              </a:lnSpc>
+              <a:spcBef>
+                <a:spcPts val="500"/>
+              </a:spcBef>
+              <a:buFont typeface="Arial" panose="020B0604020202020204" pitchFamily="34" charset="0"/>
+              <a:buChar char="•"/>
+              <a:defRPr sz="1800" kern="1200">
+                <a:solidFill>
+                  <a:schemeClr val="tx1"/>
+                </a:solidFill>
+                <a:latin typeface="+mn-lt"/>
+                <a:ea typeface="+mn-ea"/>
+                <a:cs typeface="+mn-cs"/>
+              </a:defRPr>
+            </a:lvl8pPr>
+            <a:lvl9pPr marL="3886200" indent="-228600" algn="l" defTabSz="914400" rtl="0" eaLnBrk="1" latinLnBrk="0" hangingPunct="1">
+              <a:lnSpc>
+                <a:spcPct val="90000"/>
+              </a:lnSpc>
+              <a:spcBef>
+                <a:spcPts val="500"/>
+              </a:spcBef>
+              <a:buFont typeface="Arial" panose="020B0604020202020204" pitchFamily="34" charset="0"/>
+              <a:buChar char="•"/>
+              <a:defRPr sz="1800" kern="1200">
+                <a:solidFill>
+                  <a:schemeClr val="tx1"/>
+                </a:solidFill>
+                <a:latin typeface="+mn-lt"/>
+                <a:ea typeface="+mn-ea"/>
+                <a:cs typeface="+mn-cs"/>
+              </a:defRPr>
+            </a:lvl9pPr>
+          </a:lstStyle>
+          <a:p>
+            <a:pPr marL="0" indent="0">
+              <a:lnSpc>
+                <a:spcPct val="100000"/>
+              </a:lnSpc>
+              <a:buNone/>
+            </a:pPr>
+            <a:r>
+              <a:rPr lang="en-GB" sz="1600" dirty="0">
+                <a:latin typeface="DejaVu Sans Book" panose="020B0603030804020204" pitchFamily="34" charset="0"/>
+                <a:ea typeface="DejaVu Sans Book" panose="020B0603030804020204" pitchFamily="34" charset="0"/>
+                <a:cs typeface="DejaVu Sans Book" panose="020B0603030804020204" pitchFamily="34" charset="0"/>
+              </a:rPr>
+              <a:t>&gt; let </a:t>
+            </a:r>
+            <a:r>
+              <a:rPr lang="en-GB" sz="1600" dirty="0" err="1">
+                <a:latin typeface="DejaVu Sans Book" panose="020B0603030804020204" pitchFamily="34" charset="0"/>
+                <a:ea typeface="DejaVu Sans Book" panose="020B0603030804020204" pitchFamily="34" charset="0"/>
+                <a:cs typeface="DejaVu Sans Book" panose="020B0603030804020204" pitchFamily="34" charset="0"/>
+              </a:rPr>
+              <a:t>str</a:t>
+            </a:r>
+            <a:r>
+              <a:rPr lang="en-GB" sz="1600" dirty="0">
+                <a:latin typeface="DejaVu Sans Book" panose="020B0603030804020204" pitchFamily="34" charset="0"/>
+                <a:ea typeface="DejaVu Sans Book" panose="020B0603030804020204" pitchFamily="34" charset="0"/>
+                <a:cs typeface="DejaVu Sans Book" panose="020B0603030804020204" pitchFamily="34" charset="0"/>
+              </a:rPr>
+              <a:t> =</a:t>
+            </a:r>
+          </a:p>
+          <a:p>
+            <a:pPr marL="0" indent="0">
+              <a:lnSpc>
+                <a:spcPct val="100000"/>
+              </a:lnSpc>
+              <a:buNone/>
+            </a:pPr>
+            <a:r>
+              <a:rPr lang="en-GB" sz="1600" dirty="0">
+                <a:latin typeface="DejaVu Sans Book" panose="020B0603030804020204" pitchFamily="34" charset="0"/>
+                <a:ea typeface="DejaVu Sans Book" panose="020B0603030804020204" pitchFamily="34" charset="0"/>
+                <a:cs typeface="DejaVu Sans Book" panose="020B0603030804020204" pitchFamily="34" charset="0"/>
+              </a:rPr>
+              <a:t>-   if 3 &lt; 2 then</a:t>
+            </a:r>
+          </a:p>
+          <a:p>
+            <a:pPr marL="0" indent="0">
+              <a:lnSpc>
+                <a:spcPct val="100000"/>
+              </a:lnSpc>
+              <a:buNone/>
+            </a:pPr>
+            <a:r>
+              <a:rPr lang="en-GB" sz="1600" dirty="0">
+                <a:latin typeface="DejaVu Sans Book" panose="020B0603030804020204" pitchFamily="34" charset="0"/>
+                <a:ea typeface="DejaVu Sans Book" panose="020B0603030804020204" pitchFamily="34" charset="0"/>
+                <a:cs typeface="DejaVu Sans Book" panose="020B0603030804020204" pitchFamily="34" charset="0"/>
+              </a:rPr>
+              <a:t>-     "3 &lt; 2"</a:t>
+            </a:r>
+          </a:p>
+          <a:p>
+            <a:pPr marL="0" indent="0">
+              <a:lnSpc>
+                <a:spcPct val="100000"/>
+              </a:lnSpc>
+              <a:buNone/>
+            </a:pPr>
+            <a:r>
+              <a:rPr lang="en-GB" sz="1600" dirty="0">
+                <a:latin typeface="DejaVu Sans Book" panose="020B0603030804020204" pitchFamily="34" charset="0"/>
+                <a:ea typeface="DejaVu Sans Book" panose="020B0603030804020204" pitchFamily="34" charset="0"/>
+                <a:cs typeface="DejaVu Sans Book" panose="020B0603030804020204" pitchFamily="34" charset="0"/>
+              </a:rPr>
+              <a:t>-   else</a:t>
+            </a:r>
+          </a:p>
+          <a:p>
+            <a:pPr marL="0" indent="0">
+              <a:lnSpc>
+                <a:spcPct val="100000"/>
+              </a:lnSpc>
+              <a:buNone/>
+            </a:pPr>
+            <a:r>
+              <a:rPr lang="en-GB" sz="1600" dirty="0">
+                <a:latin typeface="DejaVu Sans Book" panose="020B0603030804020204" pitchFamily="34" charset="0"/>
+                <a:ea typeface="DejaVu Sans Book" panose="020B0603030804020204" pitchFamily="34" charset="0"/>
+                <a:cs typeface="DejaVu Sans Book" panose="020B0603030804020204" pitchFamily="34" charset="0"/>
+              </a:rPr>
+              <a:t>-     "3 &gt;= 2";;</a:t>
+            </a:r>
+          </a:p>
+          <a:p>
+            <a:pPr marL="0" indent="0">
+              <a:lnSpc>
+                <a:spcPct val="100000"/>
+              </a:lnSpc>
+              <a:buNone/>
+            </a:pPr>
+            <a:r>
+              <a:rPr lang="en-GB" sz="1600" dirty="0" err="1">
+                <a:latin typeface="DejaVu Sans Book" panose="020B0603030804020204" pitchFamily="34" charset="0"/>
+                <a:ea typeface="DejaVu Sans Book" panose="020B0603030804020204" pitchFamily="34" charset="0"/>
+                <a:cs typeface="DejaVu Sans Book" panose="020B0603030804020204" pitchFamily="34" charset="0"/>
+              </a:rPr>
+              <a:t>val</a:t>
+            </a:r>
+            <a:r>
+              <a:rPr lang="en-GB" sz="1600" dirty="0">
+                <a:latin typeface="DejaVu Sans Book" panose="020B0603030804020204" pitchFamily="34" charset="0"/>
+                <a:ea typeface="DejaVu Sans Book" panose="020B0603030804020204" pitchFamily="34" charset="0"/>
+                <a:cs typeface="DejaVu Sans Book" panose="020B0603030804020204" pitchFamily="34" charset="0"/>
+              </a:rPr>
+              <a:t> </a:t>
+            </a:r>
+            <a:r>
+              <a:rPr lang="en-GB" sz="1600" dirty="0" err="1">
+                <a:latin typeface="DejaVu Sans Book" panose="020B0603030804020204" pitchFamily="34" charset="0"/>
+                <a:ea typeface="DejaVu Sans Book" panose="020B0603030804020204" pitchFamily="34" charset="0"/>
+                <a:cs typeface="DejaVu Sans Book" panose="020B0603030804020204" pitchFamily="34" charset="0"/>
+              </a:rPr>
+              <a:t>str</a:t>
+            </a:r>
+            <a:r>
+              <a:rPr lang="en-GB" sz="1600" dirty="0">
+                <a:latin typeface="DejaVu Sans Book" panose="020B0603030804020204" pitchFamily="34" charset="0"/>
+                <a:ea typeface="DejaVu Sans Book" panose="020B0603030804020204" pitchFamily="34" charset="0"/>
+                <a:cs typeface="DejaVu Sans Book" panose="020B0603030804020204" pitchFamily="34" charset="0"/>
+              </a:rPr>
+              <a:t> : string = "3 &gt;= 2"</a:t>
+            </a:r>
+          </a:p>
+        </p:txBody>
+      </p:sp>
+    </p:spTree>
+    <p:extLst>
+      <p:ext uri="{BB962C8B-B14F-4D97-AF65-F5344CB8AC3E}">
+        <p14:creationId xmlns:p14="http://schemas.microsoft.com/office/powerpoint/2010/main" val="2839907258"/>
+      </p:ext>
+    </p:extLst>
+  </p:cSld>
+  <p:clrMapOvr>
+    <a:masterClrMapping/>
+  </p:clrMapOvr>
+  <p:timing>
+    <p:tnLst>
+      <p:par>
+        <p:cTn id="1" dur="indefinite" restart="never" nodeType="tmRoot">
+          <p:childTnLst>
+            <p:seq concurrent="1" nextAc="seek">
+              <p:cTn id="2" dur="indefinite" nodeType="mainSeq">
+                <p:childTnLst>
+                  <p:par>
+                    <p:cTn id="3" fill="hold">
+                      <p:stCondLst>
+                        <p:cond delay="indefinite"/>
+                      </p:stCondLst>
+                      <p:childTnLst>
+                        <p:par>
+                          <p:cTn id="4" fill="hold">
+                            <p:stCondLst>
+                              <p:cond delay="0"/>
+                            </p:stCondLst>
+                            <p:childTnLst>
+                              <p:par>
+                                <p:cTn id="5" presetID="1" presetClass="entr" presetSubtype="0" fill="hold" nodeType="clickEffect">
+                                  <p:stCondLst>
+                                    <p:cond delay="0"/>
+                                  </p:stCondLst>
+                                  <p:childTnLst>
+                                    <p:set>
+                                      <p:cBhvr>
+                                        <p:cTn id="6" dur="1" fill="hold">
+                                          <p:stCondLst>
+                                            <p:cond delay="0"/>
+                                          </p:stCondLst>
+                                        </p:cTn>
+                                        <p:tgtEl>
+                                          <p:spTgt spid="10"/>
+                                        </p:tgtEl>
+                                        <p:attrNameLst>
+                                          <p:attrName>style.visibility</p:attrName>
+                                        </p:attrNameLst>
+                                      </p:cBhvr>
+                                      <p:to>
+                                        <p:strVal val="visible"/>
+                                      </p:to>
+                                    </p:set>
+                                  </p:childTnLst>
+                                </p:cTn>
+                              </p:par>
+                              <p:par>
+                                <p:cTn id="7" presetID="1" presetClass="entr" presetSubtype="0" fill="hold" grpId="0" nodeType="withEffect">
+                                  <p:stCondLst>
+                                    <p:cond delay="0"/>
+                                  </p:stCondLst>
+                                  <p:childTnLst>
+                                    <p:set>
+                                      <p:cBhvr>
+                                        <p:cTn id="8" dur="1" fill="hold">
+                                          <p:stCondLst>
+                                            <p:cond delay="0"/>
+                                          </p:stCondLst>
+                                        </p:cTn>
+                                        <p:tgtEl>
+                                          <p:spTgt spid="11"/>
+                                        </p:tgtEl>
+                                        <p:attrNameLst>
+                                          <p:attrName>style.visibility</p:attrName>
+                                        </p:attrNameLst>
+                                      </p:cBhvr>
+                                      <p:to>
+                                        <p:strVal val="visible"/>
+                                      </p:to>
+                                    </p:set>
+                                  </p:childTnLst>
+                                </p:cTn>
+                              </p:par>
+                              <p:par>
+                                <p:cTn id="9" presetID="1" presetClass="entr" presetSubtype="0" fill="hold" grpId="0" nodeType="withEffect">
+                                  <p:stCondLst>
+                                    <p:cond delay="0"/>
+                                  </p:stCondLst>
+                                  <p:childTnLst>
+                                    <p:set>
+                                      <p:cBhvr>
+                                        <p:cTn id="10" dur="1" fill="hold">
+                                          <p:stCondLst>
+                                            <p:cond delay="0"/>
+                                          </p:stCondLst>
+                                        </p:cTn>
+                                        <p:tgtEl>
+                                          <p:spTgt spid="9"/>
+                                        </p:tgtEl>
+                                        <p:attrNameLst>
+                                          <p:attrName>style.visibility</p:attrName>
+                                        </p:attrNameLst>
+                                      </p:cBhvr>
+                                      <p:to>
+                                        <p:strVal val="visible"/>
+                                      </p:to>
+                                    </p:set>
+                                  </p:childTnLst>
+                                </p:cTn>
+                              </p:par>
+                            </p:childTnLst>
+                          </p:cTn>
+                        </p:par>
+                      </p:childTnLst>
+                    </p:cTn>
+                  </p:par>
+                  <p:par>
+                    <p:cTn id="11" fill="hold">
+                      <p:stCondLst>
+                        <p:cond delay="indefinite"/>
+                      </p:stCondLst>
+                      <p:childTnLst>
+                        <p:par>
+                          <p:cTn id="12" fill="hold">
+                            <p:stCondLst>
+                              <p:cond delay="0"/>
+                            </p:stCondLst>
+                            <p:childTnLst>
+                              <p:par>
+                                <p:cTn id="13" presetID="1" presetClass="entr" presetSubtype="0" fill="hold" grpId="0" nodeType="clickEffect">
+                                  <p:stCondLst>
+                                    <p:cond delay="0"/>
+                                  </p:stCondLst>
+                                  <p:childTnLst>
+                                    <p:set>
+                                      <p:cBhvr>
+                                        <p:cTn id="14" dur="1" fill="hold">
+                                          <p:stCondLst>
+                                            <p:cond delay="0"/>
+                                          </p:stCondLst>
+                                        </p:cTn>
+                                        <p:tgtEl>
+                                          <p:spTgt spid="12"/>
+                                        </p:tgtEl>
+                                        <p:attrNameLst>
+                                          <p:attrName>style.visibility</p:attrName>
+                                        </p:attrNameLst>
+                                      </p:cBhvr>
+                                      <p:to>
+                                        <p:strVal val="visible"/>
+                                      </p:to>
+                                    </p:set>
+                                  </p:childTnLst>
+                                </p:cTn>
+                              </p:par>
+                            </p:childTnLst>
+                          </p:cTn>
+                        </p:par>
+                      </p:childTnLst>
+                    </p:cTn>
+                  </p:par>
+                  <p:par>
+                    <p:cTn id="15" fill="hold">
+                      <p:stCondLst>
+                        <p:cond delay="indefinite"/>
+                      </p:stCondLst>
+                      <p:childTnLst>
+                        <p:par>
+                          <p:cTn id="16" fill="hold">
+                            <p:stCondLst>
+                              <p:cond delay="0"/>
+                            </p:stCondLst>
+                            <p:childTnLst>
+                              <p:par>
+                                <p:cTn id="17" presetID="1" presetClass="entr" presetSubtype="0" fill="hold" nodeType="clickEffect">
+                                  <p:stCondLst>
+                                    <p:cond delay="0"/>
+                                  </p:stCondLst>
+                                  <p:childTnLst>
+                                    <p:set>
+                                      <p:cBhvr>
+                                        <p:cTn id="18" dur="1" fill="hold">
+                                          <p:stCondLst>
+                                            <p:cond delay="0"/>
+                                          </p:stCondLst>
+                                        </p:cTn>
+                                        <p:tgtEl>
+                                          <p:spTgt spid="7"/>
+                                        </p:tgtEl>
+                                        <p:attrNameLst>
+                                          <p:attrName>style.visibility</p:attrName>
+                                        </p:attrNameLst>
+                                      </p:cBhvr>
+                                      <p:to>
+                                        <p:strVal val="visible"/>
+                                      </p:to>
+                                    </p:set>
+                                  </p:childTnLst>
+                                </p:cTn>
+                              </p:par>
+                              <p:par>
+                                <p:cTn id="19" presetID="1" presetClass="entr" presetSubtype="0" fill="hold" grpId="0" nodeType="withEffect">
+                                  <p:stCondLst>
+                                    <p:cond delay="0"/>
+                                  </p:stCondLst>
+                                  <p:childTnLst>
+                                    <p:set>
+                                      <p:cBhvr>
+                                        <p:cTn id="20" dur="1" fill="hold">
+                                          <p:stCondLst>
+                                            <p:cond delay="0"/>
+                                          </p:stCondLst>
+                                        </p:cTn>
+                                        <p:tgtEl>
+                                          <p:spTgt spid="8"/>
+                                        </p:tgtEl>
+                                        <p:attrNameLst>
+                                          <p:attrName>style.visibility</p:attrName>
+                                        </p:attrNameLst>
+                                      </p:cBhvr>
+                                      <p:to>
+                                        <p:strVal val="visible"/>
+                                      </p:to>
+                                    </p:set>
+                                  </p:childTnLst>
+                                </p:cTn>
+                              </p:par>
+                              <p:par>
+                                <p:cTn id="21" presetID="1" presetClass="entr" presetSubtype="0" fill="hold" grpId="0" nodeType="withEffect">
+                                  <p:stCondLst>
+                                    <p:cond delay="0"/>
+                                  </p:stCondLst>
+                                  <p:childTnLst>
+                                    <p:set>
+                                      <p:cBhvr>
+                                        <p:cTn id="22" dur="1" fill="hold">
+                                          <p:stCondLst>
+                                            <p:cond delay="0"/>
+                                          </p:stCondLst>
+                                        </p:cTn>
+                                        <p:tgtEl>
+                                          <p:spTgt spid="6"/>
+                                        </p:tgtEl>
+                                        <p:attrNameLst>
+                                          <p:attrName>style.visibility</p:attrName>
+                                        </p:attrNameLst>
+                                      </p:cBhvr>
+                                      <p:to>
+                                        <p:strVal val="visible"/>
+                                      </p:to>
+                                    </p:set>
+                                  </p:childTnLst>
+                                </p:cTn>
+                              </p:par>
+                            </p:childTnLst>
+                          </p:cTn>
+                        </p:par>
+                      </p:childTnLst>
+                    </p:cTn>
+                  </p:par>
+                </p:childTnLst>
+              </p:cTn>
+              <p:prevCondLst>
+                <p:cond evt="onPrev" delay="0">
+                  <p:tgtEl>
+                    <p:sldTgt/>
+                  </p:tgtEl>
+                </p:cond>
+              </p:prevCondLst>
+              <p:nextCondLst>
+                <p:cond evt="onNext" delay="0">
+                  <p:tgtEl>
+                    <p:sldTgt/>
+                  </p:tgtEl>
+                </p:cond>
+              </p:nextCondLst>
+            </p:seq>
+          </p:childTnLst>
+        </p:cTn>
+      </p:par>
+    </p:tnLst>
+    <p:bldLst>
+      <p:bldP spid="6" grpId="0"/>
+      <p:bldP spid="8" grpId="0"/>
+      <p:bldP spid="9" grpId="0"/>
+      <p:bldP spid="11" grpId="0"/>
+      <p:bldP spid="12" grpId="0"/>
+    </p:bldLst>
+  </p:timing>
+</p:sld>
+</file>
+
+<file path=ppt/slides/slide11.xml><?xml version="1.0" encoding="utf-8"?>
 <p:sld xmlns:a="http://schemas.openxmlformats.org/drawingml/2006/main" xmlns:r="http://schemas.openxmlformats.org/officeDocument/2006/relationships" xmlns:p="http://schemas.openxmlformats.org/presentationml/2006/main">
   <p:cSld>
     <p:spTree>
@@ -8851,7 +10418,7 @@
 </p:sld>
 </file>
 
-<file path=ppt/slides/slide11.xml><?xml version="1.0" encoding="utf-8"?>
+<file path=ppt/slides/slide12.xml><?xml version="1.0" encoding="utf-8"?>
 <p:sld xmlns:a="http://schemas.openxmlformats.org/drawingml/2006/main" xmlns:r="http://schemas.openxmlformats.org/officeDocument/2006/relationships" xmlns:p="http://schemas.openxmlformats.org/presentationml/2006/main">
   <p:cSld>
     <p:spTree>
@@ -9224,7 +10791,7 @@
 </p:sld>
 </file>
 
-<file path=ppt/slides/slide12.xml><?xml version="1.0" encoding="utf-8"?>
+<file path=ppt/slides/slide13.xml><?xml version="1.0" encoding="utf-8"?>
 <p:sld xmlns:a="http://schemas.openxmlformats.org/drawingml/2006/main" xmlns:r="http://schemas.openxmlformats.org/officeDocument/2006/relationships" xmlns:p="http://schemas.openxmlformats.org/presentationml/2006/main">
   <p:cSld>
     <p:spTree>
@@ -11846,7 +13413,7 @@
 </p:sld>
 </file>
 
-<file path=ppt/slides/slide13.xml><?xml version="1.0" encoding="utf-8"?>
+<file path=ppt/slides/slide14.xml><?xml version="1.0" encoding="utf-8"?>
 <p:sld xmlns:a="http://schemas.openxmlformats.org/drawingml/2006/main" xmlns:r="http://schemas.openxmlformats.org/officeDocument/2006/relationships" xmlns:p="http://schemas.openxmlformats.org/presentationml/2006/main" show="0">
   <p:cSld>
     <p:spTree>
@@ -13784,7 +15351,7 @@
 </p:sld>
 </file>
 
-<file path=ppt/slides/slide14.xml><?xml version="1.0" encoding="utf-8"?>
+<file path=ppt/slides/slide15.xml><?xml version="1.0" encoding="utf-8"?>
 <p:sld xmlns:a="http://schemas.openxmlformats.org/drawingml/2006/main" xmlns:r="http://schemas.openxmlformats.org/officeDocument/2006/relationships" xmlns:p="http://schemas.openxmlformats.org/presentationml/2006/main" show="0">
   <p:cSld>
     <p:spTree>
@@ -14272,6 +15839,121 @@
 </file>
 
 <file path=ppt/slides/slide2.xml><?xml version="1.0" encoding="utf-8"?>
+<p:sld xmlns:a="http://schemas.openxmlformats.org/drawingml/2006/main" xmlns:r="http://schemas.openxmlformats.org/officeDocument/2006/relationships" xmlns:p="http://schemas.openxmlformats.org/presentationml/2006/main">
+  <p:cSld>
+    <p:spTree>
+      <p:nvGrpSpPr>
+        <p:cNvPr id="1" name=""/>
+        <p:cNvGrpSpPr/>
+        <p:nvPr/>
+      </p:nvGrpSpPr>
+      <p:grpSpPr>
+        <a:xfrm>
+          <a:off x="0" y="0"/>
+          <a:ext cx="0" cy="0"/>
+          <a:chOff x="0" y="0"/>
+          <a:chExt cx="0" cy="0"/>
+        </a:xfrm>
+      </p:grpSpPr>
+      <p:sp>
+        <p:nvSpPr>
+          <p:cNvPr id="2" name="Title 1">
+            <a:extLst>
+              <a:ext uri="{FF2B5EF4-FFF2-40B4-BE49-F238E27FC236}">
+                <a16:creationId xmlns:a16="http://schemas.microsoft.com/office/drawing/2014/main" id="{41816F2A-6941-304D-B30C-2C04B2AF0C54}"/>
+              </a:ext>
+            </a:extLst>
+          </p:cNvPr>
+          <p:cNvSpPr>
+            <a:spLocks noGrp="1"/>
+          </p:cNvSpPr>
+          <p:nvPr>
+            <p:ph type="title"/>
+          </p:nvPr>
+        </p:nvSpPr>
+        <p:spPr/>
+        <p:txBody>
+          <a:bodyPr/>
+          <a:lstStyle/>
+          <a:p>
+            <a:r>
+              <a:rPr lang="da-DK" dirty="0"/>
+              <a:t>Annonceringer</a:t>
+            </a:r>
+          </a:p>
+        </p:txBody>
+      </p:sp>
+      <p:sp>
+        <p:nvSpPr>
+          <p:cNvPr id="3" name="Content Placeholder 2">
+            <a:extLst>
+              <a:ext uri="{FF2B5EF4-FFF2-40B4-BE49-F238E27FC236}">
+                <a16:creationId xmlns:a16="http://schemas.microsoft.com/office/drawing/2014/main" id="{085BA256-CF1F-0243-A2C7-C7A42AD1E88B}"/>
+              </a:ext>
+            </a:extLst>
+          </p:cNvPr>
+          <p:cNvSpPr>
+            <a:spLocks noGrp="1"/>
+          </p:cNvSpPr>
+          <p:nvPr>
+            <p:ph idx="1"/>
+          </p:nvPr>
+        </p:nvSpPr>
+        <p:spPr/>
+        <p:txBody>
+          <a:bodyPr/>
+          <a:lstStyle/>
+          <a:p>
+            <a:r>
+              <a:rPr lang="da-DK" dirty="0"/>
+              <a:t>Reeksamen på studiestartsprøven kører nu på torsdag d. 19/9 kl 9.00 til fredag d. 20/19 kl. 12.00. </a:t>
+            </a:r>
+            <a:br>
+              <a:rPr lang="da-DK" dirty="0"/>
+            </a:br>
+            <a:br>
+              <a:rPr lang="da-DK" dirty="0"/>
+            </a:br>
+            <a:r>
+              <a:rPr lang="da-DK" dirty="0"/>
+              <a:t>De der er tilmeldt reeksamen får en e-mail med link til studiestartsprøven på deres </a:t>
+            </a:r>
+            <a:r>
+              <a:rPr lang="da-DK" dirty="0" err="1"/>
+              <a:t>KU-mail</a:t>
+            </a:r>
+            <a:r>
+              <a:rPr lang="da-DK" dirty="0"/>
+              <a:t> på torsdag. Hvis de har problemer eller spørgsmål skal de kontakte Studenterservice hurtigst muligt på </a:t>
+            </a:r>
+            <a:r>
+              <a:rPr lang="da-DK" u="sng" dirty="0">
+                <a:hlinkClick r:id="rId2" tooltip="mailto:studenterservice@science.ku.dk"/>
+              </a:rPr>
+              <a:t>studenterservice@science.ku.dk</a:t>
+            </a:r>
+            <a:r>
+              <a:rPr lang="da-DK" dirty="0"/>
+              <a:t>.</a:t>
+            </a:r>
+            <a:endParaRPr lang="en-GB" dirty="0"/>
+          </a:p>
+        </p:txBody>
+      </p:sp>
+    </p:spTree>
+    <p:extLst>
+      <p:ext uri="{BB962C8B-B14F-4D97-AF65-F5344CB8AC3E}">
+        <p14:creationId xmlns:p14="http://schemas.microsoft.com/office/powerpoint/2010/main" val="996436937"/>
+      </p:ext>
+    </p:extLst>
+  </p:cSld>
+  <p:clrMapOvr>
+    <a:masterClrMapping/>
+  </p:clrMapOvr>
+</p:sld>
+</file>
+
+<file path=ppt/slides/slide3.xml><?xml version="1.0" encoding="utf-8"?>
 <p:sld xmlns:a="http://schemas.openxmlformats.org/drawingml/2006/main" xmlns:r="http://schemas.openxmlformats.org/officeDocument/2006/relationships" xmlns:p="http://schemas.openxmlformats.org/presentationml/2006/main">
   <p:cSld>
     <p:spTree>
@@ -15804,7 +17486,7 @@
 </p:sld>
 </file>
 
-<file path=ppt/slides/slide3.xml><?xml version="1.0" encoding="utf-8"?>
+<file path=ppt/slides/slide4.xml><?xml version="1.0" encoding="utf-8"?>
 <p:sld xmlns:a="http://schemas.openxmlformats.org/drawingml/2006/main" xmlns:r="http://schemas.openxmlformats.org/officeDocument/2006/relationships" xmlns:p="http://schemas.openxmlformats.org/presentationml/2006/main">
   <p:cSld>
     <p:spTree>
@@ -16842,7 +18524,7 @@
 </p:sld>
 </file>
 
-<file path=ppt/slides/slide4.xml><?xml version="1.0" encoding="utf-8"?>
+<file path=ppt/slides/slide5.xml><?xml version="1.0" encoding="utf-8"?>
 <p:sld xmlns:a="http://schemas.openxmlformats.org/drawingml/2006/main" xmlns:r="http://schemas.openxmlformats.org/officeDocument/2006/relationships" xmlns:p="http://schemas.openxmlformats.org/presentationml/2006/main">
   <p:cSld>
     <p:spTree>
@@ -19766,7 +21448,7 @@
 </p:sld>
 </file>
 
-<file path=ppt/slides/slide5.xml><?xml version="1.0" encoding="utf-8"?>
+<file path=ppt/slides/slide6.xml><?xml version="1.0" encoding="utf-8"?>
 <p:sld xmlns:a="http://schemas.openxmlformats.org/drawingml/2006/main" xmlns:r="http://schemas.openxmlformats.org/officeDocument/2006/relationships" xmlns:p="http://schemas.openxmlformats.org/presentationml/2006/main">
   <p:cSld>
     <p:spTree>
@@ -21678,7 +23360,7 @@
 </p:sld>
 </file>
 
-<file path=ppt/slides/slide6.xml><?xml version="1.0" encoding="utf-8"?>
+<file path=ppt/slides/slide7.xml><?xml version="1.0" encoding="utf-8"?>
 <p:sld xmlns:a="http://schemas.openxmlformats.org/drawingml/2006/main" xmlns:r="http://schemas.openxmlformats.org/officeDocument/2006/relationships" xmlns:p="http://schemas.openxmlformats.org/presentationml/2006/main">
   <p:cSld>
     <p:spTree>
@@ -22394,7 +24076,7 @@
 </p:sld>
 </file>
 
-<file path=ppt/slides/slide7.xml><?xml version="1.0" encoding="utf-8"?>
+<file path=ppt/slides/slide8.xml><?xml version="1.0" encoding="utf-8"?>
 <p:sld xmlns:a="http://schemas.openxmlformats.org/drawingml/2006/main" xmlns:r="http://schemas.openxmlformats.org/officeDocument/2006/relationships" xmlns:p="http://schemas.openxmlformats.org/presentationml/2006/main">
   <p:cSld>
     <p:spTree>
@@ -23674,7 +25356,7 @@
 </p:sld>
 </file>
 
-<file path=ppt/slides/slide8.xml><?xml version="1.0" encoding="utf-8"?>
+<file path=ppt/slides/slide9.xml><?xml version="1.0" encoding="utf-8"?>
 <p:sld xmlns:a="http://schemas.openxmlformats.org/drawingml/2006/main" xmlns:r="http://schemas.openxmlformats.org/officeDocument/2006/relationships" xmlns:p="http://schemas.openxmlformats.org/presentationml/2006/main" show="0">
   <p:cSld>
     <p:spTree>
@@ -24691,1572 +26373,6 @@
   <p:clrMapOvr>
     <a:masterClrMapping/>
   </p:clrMapOvr>
-</p:sld>
-</file>
-
-<file path=ppt/slides/slide9.xml><?xml version="1.0" encoding="utf-8"?>
-<p:sld xmlns:a="http://schemas.openxmlformats.org/drawingml/2006/main" xmlns:r="http://schemas.openxmlformats.org/officeDocument/2006/relationships" xmlns:p="http://schemas.openxmlformats.org/presentationml/2006/main">
-  <p:cSld>
-    <p:spTree>
-      <p:nvGrpSpPr>
-        <p:cNvPr id="1" name=""/>
-        <p:cNvGrpSpPr/>
-        <p:nvPr/>
-      </p:nvGrpSpPr>
-      <p:grpSpPr>
-        <a:xfrm>
-          <a:off x="0" y="0"/>
-          <a:ext cx="0" cy="0"/>
-          <a:chOff x="0" y="0"/>
-          <a:chExt cx="0" cy="0"/>
-        </a:xfrm>
-      </p:grpSpPr>
-      <p:sp>
-        <p:nvSpPr>
-          <p:cNvPr id="2" name="Title 1">
-            <a:extLst>
-              <a:ext uri="{FF2B5EF4-FFF2-40B4-BE49-F238E27FC236}">
-                <a16:creationId xmlns:a16="http://schemas.microsoft.com/office/drawing/2014/main" id="{FA8A84ED-08C9-EC4A-8078-BEFF32764DDE}"/>
-              </a:ext>
-            </a:extLst>
-          </p:cNvPr>
-          <p:cNvSpPr>
-            <a:spLocks noGrp="1"/>
-          </p:cNvSpPr>
-          <p:nvPr>
-            <p:ph type="title"/>
-          </p:nvPr>
-        </p:nvSpPr>
-        <p:spPr/>
-        <p:txBody>
-          <a:bodyPr/>
-          <a:lstStyle/>
-          <a:p>
-            <a:r>
-              <a:rPr lang="en-GB" dirty="0" err="1"/>
-              <a:t>Betingelser</a:t>
-            </a:r>
-            <a:endParaRPr lang="en-GB" dirty="0"/>
-          </a:p>
-        </p:txBody>
-      </p:sp>
-      <p:pic>
-        <p:nvPicPr>
-          <p:cNvPr id="5" name="Content Placeholder 4">
-            <a:extLst>
-              <a:ext uri="{FF2B5EF4-FFF2-40B4-BE49-F238E27FC236}">
-                <a16:creationId xmlns:a16="http://schemas.microsoft.com/office/drawing/2014/main" id="{87235312-F3A4-4E44-841D-CC127F128714}"/>
-              </a:ext>
-            </a:extLst>
-          </p:cNvPr>
-          <p:cNvPicPr>
-            <a:picLocks noGrp="1" noChangeAspect="1"/>
-          </p:cNvPicPr>
-          <p:nvPr>
-            <p:ph idx="1"/>
-          </p:nvPr>
-        </p:nvPicPr>
-        <p:blipFill>
-          <a:blip r:embed="rId2"/>
-          <a:stretch>
-            <a:fillRect/>
-          </a:stretch>
-        </p:blipFill>
-        <p:spPr>
-          <a:xfrm>
-            <a:off x="1311656" y="2372138"/>
-            <a:ext cx="1778000" cy="1905000"/>
-          </a:xfrm>
-        </p:spPr>
-      </p:pic>
-      <p:sp>
-        <p:nvSpPr>
-          <p:cNvPr id="6" name="Content Placeholder 2">
-            <a:extLst>
-              <a:ext uri="{FF2B5EF4-FFF2-40B4-BE49-F238E27FC236}">
-                <a16:creationId xmlns:a16="http://schemas.microsoft.com/office/drawing/2014/main" id="{5F758955-5CEB-A044-9283-15D7CEA92C60}"/>
-              </a:ext>
-            </a:extLst>
-          </p:cNvPr>
-          <p:cNvSpPr txBox="1">
-            <a:spLocks/>
-          </p:cNvSpPr>
-          <p:nvPr/>
-        </p:nvSpPr>
-        <p:spPr>
-          <a:xfrm>
-            <a:off x="8812729" y="1965573"/>
-            <a:ext cx="2957866" cy="3392812"/>
-          </a:xfrm>
-          <a:prstGeom prst="rect">
-            <a:avLst/>
-          </a:prstGeom>
-        </p:spPr>
-        <p:txBody>
-          <a:bodyPr vert="horz" lIns="91440" tIns="45720" rIns="91440" bIns="45720" rtlCol="0">
-            <a:noAutofit/>
-          </a:bodyPr>
-          <a:lstStyle>
-            <a:lvl1pPr marL="228600" indent="-228600" algn="l" defTabSz="914400" rtl="0" eaLnBrk="1" latinLnBrk="0" hangingPunct="1">
-              <a:lnSpc>
-                <a:spcPct val="90000"/>
-              </a:lnSpc>
-              <a:spcBef>
-                <a:spcPts val="1000"/>
-              </a:spcBef>
-              <a:buFont typeface="Arial" panose="020B0604020202020204" pitchFamily="34" charset="0"/>
-              <a:buChar char="•"/>
-              <a:defRPr sz="2800" kern="1200">
-                <a:solidFill>
-                  <a:schemeClr val="tx1"/>
-                </a:solidFill>
-                <a:latin typeface="+mn-lt"/>
-                <a:ea typeface="+mn-ea"/>
-                <a:cs typeface="+mn-cs"/>
-              </a:defRPr>
-            </a:lvl1pPr>
-            <a:lvl2pPr marL="685800" indent="-228600" algn="l" defTabSz="914400" rtl="0" eaLnBrk="1" latinLnBrk="0" hangingPunct="1">
-              <a:lnSpc>
-                <a:spcPct val="90000"/>
-              </a:lnSpc>
-              <a:spcBef>
-                <a:spcPts val="500"/>
-              </a:spcBef>
-              <a:buFont typeface="Arial" panose="020B0604020202020204" pitchFamily="34" charset="0"/>
-              <a:buChar char="•"/>
-              <a:defRPr sz="2400" kern="1200">
-                <a:solidFill>
-                  <a:schemeClr val="tx1"/>
-                </a:solidFill>
-                <a:latin typeface="+mn-lt"/>
-                <a:ea typeface="+mn-ea"/>
-                <a:cs typeface="+mn-cs"/>
-              </a:defRPr>
-            </a:lvl2pPr>
-            <a:lvl3pPr marL="1143000" indent="-228600" algn="l" defTabSz="914400" rtl="0" eaLnBrk="1" latinLnBrk="0" hangingPunct="1">
-              <a:lnSpc>
-                <a:spcPct val="90000"/>
-              </a:lnSpc>
-              <a:spcBef>
-                <a:spcPts val="500"/>
-              </a:spcBef>
-              <a:buFont typeface="Arial" panose="020B0604020202020204" pitchFamily="34" charset="0"/>
-              <a:buChar char="•"/>
-              <a:defRPr sz="2000" kern="1200">
-                <a:solidFill>
-                  <a:schemeClr val="tx1"/>
-                </a:solidFill>
-                <a:latin typeface="+mn-lt"/>
-                <a:ea typeface="+mn-ea"/>
-                <a:cs typeface="+mn-cs"/>
-              </a:defRPr>
-            </a:lvl3pPr>
-            <a:lvl4pPr marL="1600200" indent="-228600" algn="l" defTabSz="914400" rtl="0" eaLnBrk="1" latinLnBrk="0" hangingPunct="1">
-              <a:lnSpc>
-                <a:spcPct val="90000"/>
-              </a:lnSpc>
-              <a:spcBef>
-                <a:spcPts val="500"/>
-              </a:spcBef>
-              <a:buFont typeface="Arial" panose="020B0604020202020204" pitchFamily="34" charset="0"/>
-              <a:buChar char="•"/>
-              <a:defRPr sz="1800" kern="1200">
-                <a:solidFill>
-                  <a:schemeClr val="tx1"/>
-                </a:solidFill>
-                <a:latin typeface="+mn-lt"/>
-                <a:ea typeface="+mn-ea"/>
-                <a:cs typeface="+mn-cs"/>
-              </a:defRPr>
-            </a:lvl4pPr>
-            <a:lvl5pPr marL="2057400" indent="-228600" algn="l" defTabSz="914400" rtl="0" eaLnBrk="1" latinLnBrk="0" hangingPunct="1">
-              <a:lnSpc>
-                <a:spcPct val="90000"/>
-              </a:lnSpc>
-              <a:spcBef>
-                <a:spcPts val="500"/>
-              </a:spcBef>
-              <a:buFont typeface="Arial" panose="020B0604020202020204" pitchFamily="34" charset="0"/>
-              <a:buChar char="•"/>
-              <a:defRPr sz="1800" kern="1200">
-                <a:solidFill>
-                  <a:schemeClr val="tx1"/>
-                </a:solidFill>
-                <a:latin typeface="+mn-lt"/>
-                <a:ea typeface="+mn-ea"/>
-                <a:cs typeface="+mn-cs"/>
-              </a:defRPr>
-            </a:lvl5pPr>
-            <a:lvl6pPr marL="2514600" indent="-228600" algn="l" defTabSz="914400" rtl="0" eaLnBrk="1" latinLnBrk="0" hangingPunct="1">
-              <a:lnSpc>
-                <a:spcPct val="90000"/>
-              </a:lnSpc>
-              <a:spcBef>
-                <a:spcPts val="500"/>
-              </a:spcBef>
-              <a:buFont typeface="Arial" panose="020B0604020202020204" pitchFamily="34" charset="0"/>
-              <a:buChar char="•"/>
-              <a:defRPr sz="1800" kern="1200">
-                <a:solidFill>
-                  <a:schemeClr val="tx1"/>
-                </a:solidFill>
-                <a:latin typeface="+mn-lt"/>
-                <a:ea typeface="+mn-ea"/>
-                <a:cs typeface="+mn-cs"/>
-              </a:defRPr>
-            </a:lvl6pPr>
-            <a:lvl7pPr marL="2971800" indent="-228600" algn="l" defTabSz="914400" rtl="0" eaLnBrk="1" latinLnBrk="0" hangingPunct="1">
-              <a:lnSpc>
-                <a:spcPct val="90000"/>
-              </a:lnSpc>
-              <a:spcBef>
-                <a:spcPts val="500"/>
-              </a:spcBef>
-              <a:buFont typeface="Arial" panose="020B0604020202020204" pitchFamily="34" charset="0"/>
-              <a:buChar char="•"/>
-              <a:defRPr sz="1800" kern="1200">
-                <a:solidFill>
-                  <a:schemeClr val="tx1"/>
-                </a:solidFill>
-                <a:latin typeface="+mn-lt"/>
-                <a:ea typeface="+mn-ea"/>
-                <a:cs typeface="+mn-cs"/>
-              </a:defRPr>
-            </a:lvl7pPr>
-            <a:lvl8pPr marL="3429000" indent="-228600" algn="l" defTabSz="914400" rtl="0" eaLnBrk="1" latinLnBrk="0" hangingPunct="1">
-              <a:lnSpc>
-                <a:spcPct val="90000"/>
-              </a:lnSpc>
-              <a:spcBef>
-                <a:spcPts val="500"/>
-              </a:spcBef>
-              <a:buFont typeface="Arial" panose="020B0604020202020204" pitchFamily="34" charset="0"/>
-              <a:buChar char="•"/>
-              <a:defRPr sz="1800" kern="1200">
-                <a:solidFill>
-                  <a:schemeClr val="tx1"/>
-                </a:solidFill>
-                <a:latin typeface="+mn-lt"/>
-                <a:ea typeface="+mn-ea"/>
-                <a:cs typeface="+mn-cs"/>
-              </a:defRPr>
-            </a:lvl8pPr>
-            <a:lvl9pPr marL="3886200" indent="-228600" algn="l" defTabSz="914400" rtl="0" eaLnBrk="1" latinLnBrk="0" hangingPunct="1">
-              <a:lnSpc>
-                <a:spcPct val="90000"/>
-              </a:lnSpc>
-              <a:spcBef>
-                <a:spcPts val="500"/>
-              </a:spcBef>
-              <a:buFont typeface="Arial" panose="020B0604020202020204" pitchFamily="34" charset="0"/>
-              <a:buChar char="•"/>
-              <a:defRPr sz="1800" kern="1200">
-                <a:solidFill>
-                  <a:schemeClr val="tx1"/>
-                </a:solidFill>
-                <a:latin typeface="+mn-lt"/>
-                <a:ea typeface="+mn-ea"/>
-                <a:cs typeface="+mn-cs"/>
-              </a:defRPr>
-            </a:lvl9pPr>
-          </a:lstStyle>
-          <a:p>
-            <a:pPr marL="0" indent="0">
-              <a:lnSpc>
-                <a:spcPct val="100000"/>
-              </a:lnSpc>
-              <a:buNone/>
-            </a:pPr>
-            <a:r>
-              <a:rPr lang="en-GB" sz="1600" dirty="0">
-                <a:latin typeface="DejaVu Sans Book" panose="020B0603030804020204" pitchFamily="34" charset="0"/>
-                <a:ea typeface="DejaVu Sans Book" panose="020B0603030804020204" pitchFamily="34" charset="0"/>
-                <a:cs typeface="DejaVu Sans Book" panose="020B0603030804020204" pitchFamily="34" charset="0"/>
-              </a:rPr>
-              <a:t>&gt; let </a:t>
-            </a:r>
-            <a:r>
-              <a:rPr lang="en-GB" sz="1600" dirty="0" err="1">
-                <a:latin typeface="DejaVu Sans Book" panose="020B0603030804020204" pitchFamily="34" charset="0"/>
-                <a:ea typeface="DejaVu Sans Book" panose="020B0603030804020204" pitchFamily="34" charset="0"/>
-                <a:cs typeface="DejaVu Sans Book" panose="020B0603030804020204" pitchFamily="34" charset="0"/>
-              </a:rPr>
-              <a:t>str</a:t>
-            </a:r>
-            <a:r>
-              <a:rPr lang="en-GB" sz="1600" dirty="0">
-                <a:latin typeface="DejaVu Sans Book" panose="020B0603030804020204" pitchFamily="34" charset="0"/>
-                <a:ea typeface="DejaVu Sans Book" panose="020B0603030804020204" pitchFamily="34" charset="0"/>
-                <a:cs typeface="DejaVu Sans Book" panose="020B0603030804020204" pitchFamily="34" charset="0"/>
-              </a:rPr>
-              <a:t> =</a:t>
-            </a:r>
-          </a:p>
-          <a:p>
-            <a:pPr marL="0" indent="0">
-              <a:lnSpc>
-                <a:spcPct val="100000"/>
-              </a:lnSpc>
-              <a:buNone/>
-            </a:pPr>
-            <a:r>
-              <a:rPr lang="en-GB" sz="1600" dirty="0">
-                <a:latin typeface="DejaVu Sans Book" panose="020B0603030804020204" pitchFamily="34" charset="0"/>
-                <a:ea typeface="DejaVu Sans Book" panose="020B0603030804020204" pitchFamily="34" charset="0"/>
-                <a:cs typeface="DejaVu Sans Book" panose="020B0603030804020204" pitchFamily="34" charset="0"/>
-              </a:rPr>
-              <a:t>-   if 3 &lt; 2 then</a:t>
-            </a:r>
-          </a:p>
-          <a:p>
-            <a:pPr marL="0" indent="0">
-              <a:lnSpc>
-                <a:spcPct val="100000"/>
-              </a:lnSpc>
-              <a:buNone/>
-            </a:pPr>
-            <a:r>
-              <a:rPr lang="en-GB" sz="1600" dirty="0">
-                <a:latin typeface="DejaVu Sans Book" panose="020B0603030804020204" pitchFamily="34" charset="0"/>
-                <a:ea typeface="DejaVu Sans Book" panose="020B0603030804020204" pitchFamily="34" charset="0"/>
-                <a:cs typeface="DejaVu Sans Book" panose="020B0603030804020204" pitchFamily="34" charset="0"/>
-              </a:rPr>
-              <a:t>-     "3 &lt; 2"</a:t>
-            </a:r>
-          </a:p>
-          <a:p>
-            <a:pPr marL="0" indent="0">
-              <a:lnSpc>
-                <a:spcPct val="100000"/>
-              </a:lnSpc>
-              <a:buNone/>
-            </a:pPr>
-            <a:r>
-              <a:rPr lang="en-GB" sz="1600" dirty="0">
-                <a:latin typeface="DejaVu Sans Book" panose="020B0603030804020204" pitchFamily="34" charset="0"/>
-                <a:ea typeface="DejaVu Sans Book" panose="020B0603030804020204" pitchFamily="34" charset="0"/>
-                <a:cs typeface="DejaVu Sans Book" panose="020B0603030804020204" pitchFamily="34" charset="0"/>
-              </a:rPr>
-              <a:t>-   </a:t>
-            </a:r>
-            <a:r>
-              <a:rPr lang="en-GB" sz="1600" dirty="0" err="1">
-                <a:latin typeface="DejaVu Sans Book" panose="020B0603030804020204" pitchFamily="34" charset="0"/>
-                <a:ea typeface="DejaVu Sans Book" panose="020B0603030804020204" pitchFamily="34" charset="0"/>
-                <a:cs typeface="DejaVu Sans Book" panose="020B0603030804020204" pitchFamily="34" charset="0"/>
-              </a:rPr>
-              <a:t>elif</a:t>
-            </a:r>
-            <a:r>
-              <a:rPr lang="en-GB" sz="1600" dirty="0">
-                <a:latin typeface="DejaVu Sans Book" panose="020B0603030804020204" pitchFamily="34" charset="0"/>
-                <a:ea typeface="DejaVu Sans Book" panose="020B0603030804020204" pitchFamily="34" charset="0"/>
-                <a:cs typeface="DejaVu Sans Book" panose="020B0603030804020204" pitchFamily="34" charset="0"/>
-              </a:rPr>
-              <a:t> 3 = 2 then</a:t>
-            </a:r>
-          </a:p>
-          <a:p>
-            <a:pPr marL="0" indent="0">
-              <a:lnSpc>
-                <a:spcPct val="100000"/>
-              </a:lnSpc>
-              <a:buNone/>
-            </a:pPr>
-            <a:r>
-              <a:rPr lang="en-GB" sz="1600" dirty="0">
-                <a:latin typeface="DejaVu Sans Book" panose="020B0603030804020204" pitchFamily="34" charset="0"/>
-                <a:ea typeface="DejaVu Sans Book" panose="020B0603030804020204" pitchFamily="34" charset="0"/>
-                <a:cs typeface="DejaVu Sans Book" panose="020B0603030804020204" pitchFamily="34" charset="0"/>
-              </a:rPr>
-              <a:t>-     "3 = 2"</a:t>
-            </a:r>
-          </a:p>
-          <a:p>
-            <a:pPr marL="0" indent="0">
-              <a:lnSpc>
-                <a:spcPct val="100000"/>
-              </a:lnSpc>
-              <a:buNone/>
-            </a:pPr>
-            <a:r>
-              <a:rPr lang="en-GB" sz="1600" dirty="0">
-                <a:latin typeface="DejaVu Sans Book" panose="020B0603030804020204" pitchFamily="34" charset="0"/>
-                <a:ea typeface="DejaVu Sans Book" panose="020B0603030804020204" pitchFamily="34" charset="0"/>
-                <a:cs typeface="DejaVu Sans Book" panose="020B0603030804020204" pitchFamily="34" charset="0"/>
-              </a:rPr>
-              <a:t>-   else</a:t>
-            </a:r>
-          </a:p>
-          <a:p>
-            <a:pPr marL="0" indent="0">
-              <a:lnSpc>
-                <a:spcPct val="100000"/>
-              </a:lnSpc>
-              <a:buNone/>
-            </a:pPr>
-            <a:r>
-              <a:rPr lang="en-GB" sz="1600" dirty="0">
-                <a:latin typeface="DejaVu Sans Book" panose="020B0603030804020204" pitchFamily="34" charset="0"/>
-                <a:ea typeface="DejaVu Sans Book" panose="020B0603030804020204" pitchFamily="34" charset="0"/>
-                <a:cs typeface="DejaVu Sans Book" panose="020B0603030804020204" pitchFamily="34" charset="0"/>
-              </a:rPr>
-              <a:t>-     "3 &gt; 2";;</a:t>
-            </a:r>
-          </a:p>
-          <a:p>
-            <a:pPr marL="0" indent="0">
-              <a:lnSpc>
-                <a:spcPct val="100000"/>
-              </a:lnSpc>
-              <a:buNone/>
-            </a:pPr>
-            <a:r>
-              <a:rPr lang="en-GB" sz="1600" dirty="0" err="1">
-                <a:latin typeface="DejaVu Sans Book" panose="020B0603030804020204" pitchFamily="34" charset="0"/>
-                <a:ea typeface="DejaVu Sans Book" panose="020B0603030804020204" pitchFamily="34" charset="0"/>
-                <a:cs typeface="DejaVu Sans Book" panose="020B0603030804020204" pitchFamily="34" charset="0"/>
-              </a:rPr>
-              <a:t>val</a:t>
-            </a:r>
-            <a:r>
-              <a:rPr lang="en-GB" sz="1600" dirty="0">
-                <a:latin typeface="DejaVu Sans Book" panose="020B0603030804020204" pitchFamily="34" charset="0"/>
-                <a:ea typeface="DejaVu Sans Book" panose="020B0603030804020204" pitchFamily="34" charset="0"/>
-                <a:cs typeface="DejaVu Sans Book" panose="020B0603030804020204" pitchFamily="34" charset="0"/>
-              </a:rPr>
-              <a:t> </a:t>
-            </a:r>
-            <a:r>
-              <a:rPr lang="en-GB" sz="1600" dirty="0" err="1">
-                <a:latin typeface="DejaVu Sans Book" panose="020B0603030804020204" pitchFamily="34" charset="0"/>
-                <a:ea typeface="DejaVu Sans Book" panose="020B0603030804020204" pitchFamily="34" charset="0"/>
-                <a:cs typeface="DejaVu Sans Book" panose="020B0603030804020204" pitchFamily="34" charset="0"/>
-              </a:rPr>
-              <a:t>str</a:t>
-            </a:r>
-            <a:r>
-              <a:rPr lang="en-GB" sz="1600" dirty="0">
-                <a:latin typeface="DejaVu Sans Book" panose="020B0603030804020204" pitchFamily="34" charset="0"/>
-                <a:ea typeface="DejaVu Sans Book" panose="020B0603030804020204" pitchFamily="34" charset="0"/>
-                <a:cs typeface="DejaVu Sans Book" panose="020B0603030804020204" pitchFamily="34" charset="0"/>
-              </a:rPr>
-              <a:t> : string = "3 &gt; 2"</a:t>
-            </a:r>
-          </a:p>
-        </p:txBody>
-      </p:sp>
-      <p:cxnSp>
-        <p:nvCxnSpPr>
-          <p:cNvPr id="7" name="Straight Connector 6">
-            <a:extLst>
-              <a:ext uri="{FF2B5EF4-FFF2-40B4-BE49-F238E27FC236}">
-                <a16:creationId xmlns:a16="http://schemas.microsoft.com/office/drawing/2014/main" id="{1CAA9C42-779C-4D41-8F0B-22F3E683BF09}"/>
-              </a:ext>
-            </a:extLst>
-          </p:cNvPr>
-          <p:cNvCxnSpPr>
-            <a:cxnSpLocks/>
-          </p:cNvCxnSpPr>
-          <p:nvPr/>
-        </p:nvCxnSpPr>
-        <p:spPr>
-          <a:xfrm>
-            <a:off x="8208354" y="1215766"/>
-            <a:ext cx="0" cy="5260571"/>
-          </a:xfrm>
-          <a:prstGeom prst="line">
-            <a:avLst/>
-          </a:prstGeom>
-        </p:spPr>
-        <p:style>
-          <a:lnRef idx="1">
-            <a:schemeClr val="accent1"/>
-          </a:lnRef>
-          <a:fillRef idx="0">
-            <a:schemeClr val="accent1"/>
-          </a:fillRef>
-          <a:effectRef idx="0">
-            <a:schemeClr val="accent1"/>
-          </a:effectRef>
-          <a:fontRef idx="minor">
-            <a:schemeClr val="tx1"/>
-          </a:fontRef>
-        </p:style>
-      </p:cxnSp>
-      <p:sp>
-        <p:nvSpPr>
-          <p:cNvPr id="8" name="TextBox 7">
-            <a:extLst>
-              <a:ext uri="{FF2B5EF4-FFF2-40B4-BE49-F238E27FC236}">
-                <a16:creationId xmlns:a16="http://schemas.microsoft.com/office/drawing/2014/main" id="{008F05D8-1C88-724C-B55A-99C8462C11F4}"/>
-              </a:ext>
-            </a:extLst>
-          </p:cNvPr>
-          <p:cNvSpPr txBox="1"/>
-          <p:nvPr/>
-        </p:nvSpPr>
-        <p:spPr>
-          <a:xfrm>
-            <a:off x="8525869" y="1328232"/>
-            <a:ext cx="2667782" cy="461665"/>
-          </a:xfrm>
-          <a:prstGeom prst="rect">
-            <a:avLst/>
-          </a:prstGeom>
-          <a:noFill/>
-        </p:spPr>
-        <p:txBody>
-          <a:bodyPr wrap="none" rtlCol="0">
-            <a:spAutoFit/>
-          </a:bodyPr>
-          <a:lstStyle/>
-          <a:p>
-            <a:r>
-              <a:rPr lang="en-GB" sz="2400" dirty="0" err="1"/>
-              <a:t>Kæde</a:t>
-            </a:r>
-            <a:r>
-              <a:rPr lang="en-GB" sz="2400" dirty="0"/>
-              <a:t> </a:t>
-            </a:r>
-            <a:r>
-              <a:rPr lang="en-GB" sz="2400" dirty="0" err="1"/>
-              <a:t>af</a:t>
-            </a:r>
-            <a:r>
-              <a:rPr lang="en-GB" sz="2400" dirty="0"/>
-              <a:t> </a:t>
-            </a:r>
-            <a:r>
-              <a:rPr lang="en-GB" sz="2400" dirty="0" err="1"/>
-              <a:t>betingelser</a:t>
-            </a:r>
-            <a:endParaRPr lang="en-GB" sz="2400" dirty="0"/>
-          </a:p>
-        </p:txBody>
-      </p:sp>
-      <p:sp>
-        <p:nvSpPr>
-          <p:cNvPr id="9" name="Content Placeholder 2">
-            <a:extLst>
-              <a:ext uri="{FF2B5EF4-FFF2-40B4-BE49-F238E27FC236}">
-                <a16:creationId xmlns:a16="http://schemas.microsoft.com/office/drawing/2014/main" id="{445F9F68-01BF-6741-B548-46BBF40CF19E}"/>
-              </a:ext>
-            </a:extLst>
-          </p:cNvPr>
-          <p:cNvSpPr txBox="1">
-            <a:spLocks/>
-          </p:cNvSpPr>
-          <p:nvPr/>
-        </p:nvSpPr>
-        <p:spPr>
-          <a:xfrm>
-            <a:off x="4646113" y="1800981"/>
-            <a:ext cx="2541071" cy="2225250"/>
-          </a:xfrm>
-          <a:prstGeom prst="rect">
-            <a:avLst/>
-          </a:prstGeom>
-        </p:spPr>
-        <p:txBody>
-          <a:bodyPr vert="horz" lIns="91440" tIns="45720" rIns="91440" bIns="45720" rtlCol="0">
-            <a:noAutofit/>
-          </a:bodyPr>
-          <a:lstStyle>
-            <a:lvl1pPr marL="228600" indent="-228600" algn="l" defTabSz="914400" rtl="0" eaLnBrk="1" latinLnBrk="0" hangingPunct="1">
-              <a:lnSpc>
-                <a:spcPct val="90000"/>
-              </a:lnSpc>
-              <a:spcBef>
-                <a:spcPts val="1000"/>
-              </a:spcBef>
-              <a:buFont typeface="Arial" panose="020B0604020202020204" pitchFamily="34" charset="0"/>
-              <a:buChar char="•"/>
-              <a:defRPr sz="2800" kern="1200">
-                <a:solidFill>
-                  <a:schemeClr val="tx1"/>
-                </a:solidFill>
-                <a:latin typeface="+mn-lt"/>
-                <a:ea typeface="+mn-ea"/>
-                <a:cs typeface="+mn-cs"/>
-              </a:defRPr>
-            </a:lvl1pPr>
-            <a:lvl2pPr marL="685800" indent="-228600" algn="l" defTabSz="914400" rtl="0" eaLnBrk="1" latinLnBrk="0" hangingPunct="1">
-              <a:lnSpc>
-                <a:spcPct val="90000"/>
-              </a:lnSpc>
-              <a:spcBef>
-                <a:spcPts val="500"/>
-              </a:spcBef>
-              <a:buFont typeface="Arial" panose="020B0604020202020204" pitchFamily="34" charset="0"/>
-              <a:buChar char="•"/>
-              <a:defRPr sz="2400" kern="1200">
-                <a:solidFill>
-                  <a:schemeClr val="tx1"/>
-                </a:solidFill>
-                <a:latin typeface="+mn-lt"/>
-                <a:ea typeface="+mn-ea"/>
-                <a:cs typeface="+mn-cs"/>
-              </a:defRPr>
-            </a:lvl2pPr>
-            <a:lvl3pPr marL="1143000" indent="-228600" algn="l" defTabSz="914400" rtl="0" eaLnBrk="1" latinLnBrk="0" hangingPunct="1">
-              <a:lnSpc>
-                <a:spcPct val="90000"/>
-              </a:lnSpc>
-              <a:spcBef>
-                <a:spcPts val="500"/>
-              </a:spcBef>
-              <a:buFont typeface="Arial" panose="020B0604020202020204" pitchFamily="34" charset="0"/>
-              <a:buChar char="•"/>
-              <a:defRPr sz="2000" kern="1200">
-                <a:solidFill>
-                  <a:schemeClr val="tx1"/>
-                </a:solidFill>
-                <a:latin typeface="+mn-lt"/>
-                <a:ea typeface="+mn-ea"/>
-                <a:cs typeface="+mn-cs"/>
-              </a:defRPr>
-            </a:lvl3pPr>
-            <a:lvl4pPr marL="1600200" indent="-228600" algn="l" defTabSz="914400" rtl="0" eaLnBrk="1" latinLnBrk="0" hangingPunct="1">
-              <a:lnSpc>
-                <a:spcPct val="90000"/>
-              </a:lnSpc>
-              <a:spcBef>
-                <a:spcPts val="500"/>
-              </a:spcBef>
-              <a:buFont typeface="Arial" panose="020B0604020202020204" pitchFamily="34" charset="0"/>
-              <a:buChar char="•"/>
-              <a:defRPr sz="1800" kern="1200">
-                <a:solidFill>
-                  <a:schemeClr val="tx1"/>
-                </a:solidFill>
-                <a:latin typeface="+mn-lt"/>
-                <a:ea typeface="+mn-ea"/>
-                <a:cs typeface="+mn-cs"/>
-              </a:defRPr>
-            </a:lvl4pPr>
-            <a:lvl5pPr marL="2057400" indent="-228600" algn="l" defTabSz="914400" rtl="0" eaLnBrk="1" latinLnBrk="0" hangingPunct="1">
-              <a:lnSpc>
-                <a:spcPct val="90000"/>
-              </a:lnSpc>
-              <a:spcBef>
-                <a:spcPts val="500"/>
-              </a:spcBef>
-              <a:buFont typeface="Arial" panose="020B0604020202020204" pitchFamily="34" charset="0"/>
-              <a:buChar char="•"/>
-              <a:defRPr sz="1800" kern="1200">
-                <a:solidFill>
-                  <a:schemeClr val="tx1"/>
-                </a:solidFill>
-                <a:latin typeface="+mn-lt"/>
-                <a:ea typeface="+mn-ea"/>
-                <a:cs typeface="+mn-cs"/>
-              </a:defRPr>
-            </a:lvl5pPr>
-            <a:lvl6pPr marL="2514600" indent="-228600" algn="l" defTabSz="914400" rtl="0" eaLnBrk="1" latinLnBrk="0" hangingPunct="1">
-              <a:lnSpc>
-                <a:spcPct val="90000"/>
-              </a:lnSpc>
-              <a:spcBef>
-                <a:spcPts val="500"/>
-              </a:spcBef>
-              <a:buFont typeface="Arial" panose="020B0604020202020204" pitchFamily="34" charset="0"/>
-              <a:buChar char="•"/>
-              <a:defRPr sz="1800" kern="1200">
-                <a:solidFill>
-                  <a:schemeClr val="tx1"/>
-                </a:solidFill>
-                <a:latin typeface="+mn-lt"/>
-                <a:ea typeface="+mn-ea"/>
-                <a:cs typeface="+mn-cs"/>
-              </a:defRPr>
-            </a:lvl6pPr>
-            <a:lvl7pPr marL="2971800" indent="-228600" algn="l" defTabSz="914400" rtl="0" eaLnBrk="1" latinLnBrk="0" hangingPunct="1">
-              <a:lnSpc>
-                <a:spcPct val="90000"/>
-              </a:lnSpc>
-              <a:spcBef>
-                <a:spcPts val="500"/>
-              </a:spcBef>
-              <a:buFont typeface="Arial" panose="020B0604020202020204" pitchFamily="34" charset="0"/>
-              <a:buChar char="•"/>
-              <a:defRPr sz="1800" kern="1200">
-                <a:solidFill>
-                  <a:schemeClr val="tx1"/>
-                </a:solidFill>
-                <a:latin typeface="+mn-lt"/>
-                <a:ea typeface="+mn-ea"/>
-                <a:cs typeface="+mn-cs"/>
-              </a:defRPr>
-            </a:lvl7pPr>
-            <a:lvl8pPr marL="3429000" indent="-228600" algn="l" defTabSz="914400" rtl="0" eaLnBrk="1" latinLnBrk="0" hangingPunct="1">
-              <a:lnSpc>
-                <a:spcPct val="90000"/>
-              </a:lnSpc>
-              <a:spcBef>
-                <a:spcPts val="500"/>
-              </a:spcBef>
-              <a:buFont typeface="Arial" panose="020B0604020202020204" pitchFamily="34" charset="0"/>
-              <a:buChar char="•"/>
-              <a:defRPr sz="1800" kern="1200">
-                <a:solidFill>
-                  <a:schemeClr val="tx1"/>
-                </a:solidFill>
-                <a:latin typeface="+mn-lt"/>
-                <a:ea typeface="+mn-ea"/>
-                <a:cs typeface="+mn-cs"/>
-              </a:defRPr>
-            </a:lvl8pPr>
-            <a:lvl9pPr marL="3886200" indent="-228600" algn="l" defTabSz="914400" rtl="0" eaLnBrk="1" latinLnBrk="0" hangingPunct="1">
-              <a:lnSpc>
-                <a:spcPct val="90000"/>
-              </a:lnSpc>
-              <a:spcBef>
-                <a:spcPts val="500"/>
-              </a:spcBef>
-              <a:buFont typeface="Arial" panose="020B0604020202020204" pitchFamily="34" charset="0"/>
-              <a:buChar char="•"/>
-              <a:defRPr sz="1800" kern="1200">
-                <a:solidFill>
-                  <a:schemeClr val="tx1"/>
-                </a:solidFill>
-                <a:latin typeface="+mn-lt"/>
-                <a:ea typeface="+mn-ea"/>
-                <a:cs typeface="+mn-cs"/>
-              </a:defRPr>
-            </a:lvl9pPr>
-          </a:lstStyle>
-          <a:p>
-            <a:pPr marL="0" indent="0">
-              <a:lnSpc>
-                <a:spcPct val="100000"/>
-              </a:lnSpc>
-              <a:buNone/>
-            </a:pPr>
-            <a:r>
-              <a:rPr lang="en-GB" sz="1600" dirty="0">
-                <a:latin typeface="DejaVu Sans Book" panose="020B0603030804020204" pitchFamily="34" charset="0"/>
-                <a:ea typeface="DejaVu Sans Book" panose="020B0603030804020204" pitchFamily="34" charset="0"/>
-                <a:cs typeface="DejaVu Sans Book" panose="020B0603030804020204" pitchFamily="34" charset="0"/>
-              </a:rPr>
-              <a:t>&gt; if 3 &lt; 2 then       </a:t>
-            </a:r>
-          </a:p>
-          <a:p>
-            <a:pPr marL="0" indent="0">
-              <a:lnSpc>
-                <a:spcPct val="100000"/>
-              </a:lnSpc>
-              <a:buNone/>
-            </a:pPr>
-            <a:r>
-              <a:rPr lang="en-GB" sz="1600" dirty="0">
-                <a:latin typeface="DejaVu Sans Book" panose="020B0603030804020204" pitchFamily="34" charset="0"/>
-                <a:ea typeface="DejaVu Sans Book" panose="020B0603030804020204" pitchFamily="34" charset="0"/>
-                <a:cs typeface="DejaVu Sans Book" panose="020B0603030804020204" pitchFamily="34" charset="0"/>
-              </a:rPr>
-              <a:t>-   </a:t>
-            </a:r>
-            <a:r>
-              <a:rPr lang="en-GB" sz="1600" dirty="0" err="1">
-                <a:latin typeface="DejaVu Sans Book" panose="020B0603030804020204" pitchFamily="34" charset="0"/>
-                <a:ea typeface="DejaVu Sans Book" panose="020B0603030804020204" pitchFamily="34" charset="0"/>
-                <a:cs typeface="DejaVu Sans Book" panose="020B0603030804020204" pitchFamily="34" charset="0"/>
-              </a:rPr>
-              <a:t>printfn</a:t>
-            </a:r>
-            <a:r>
-              <a:rPr lang="en-GB" sz="1600" dirty="0">
-                <a:latin typeface="DejaVu Sans Book" panose="020B0603030804020204" pitchFamily="34" charset="0"/>
-                <a:ea typeface="DejaVu Sans Book" panose="020B0603030804020204" pitchFamily="34" charset="0"/>
-                <a:cs typeface="DejaVu Sans Book" panose="020B0603030804020204" pitchFamily="34" charset="0"/>
-              </a:rPr>
-              <a:t> "3 &lt; 2"   </a:t>
-            </a:r>
-          </a:p>
-          <a:p>
-            <a:pPr marL="0" indent="0">
-              <a:lnSpc>
-                <a:spcPct val="100000"/>
-              </a:lnSpc>
-              <a:buNone/>
-            </a:pPr>
-            <a:r>
-              <a:rPr lang="en-GB" sz="1600" dirty="0">
-                <a:latin typeface="DejaVu Sans Book" panose="020B0603030804020204" pitchFamily="34" charset="0"/>
-                <a:ea typeface="DejaVu Sans Book" panose="020B0603030804020204" pitchFamily="34" charset="0"/>
-                <a:cs typeface="DejaVu Sans Book" panose="020B0603030804020204" pitchFamily="34" charset="0"/>
-              </a:rPr>
-              <a:t>- else                </a:t>
-            </a:r>
-          </a:p>
-          <a:p>
-            <a:pPr marL="0" indent="0">
-              <a:lnSpc>
-                <a:spcPct val="100000"/>
-              </a:lnSpc>
-              <a:buNone/>
-            </a:pPr>
-            <a:r>
-              <a:rPr lang="en-GB" sz="1600" dirty="0">
-                <a:latin typeface="DejaVu Sans Book" panose="020B0603030804020204" pitchFamily="34" charset="0"/>
-                <a:ea typeface="DejaVu Sans Book" panose="020B0603030804020204" pitchFamily="34" charset="0"/>
-                <a:cs typeface="DejaVu Sans Book" panose="020B0603030804020204" pitchFamily="34" charset="0"/>
-              </a:rPr>
-              <a:t>-   </a:t>
-            </a:r>
-            <a:r>
-              <a:rPr lang="en-GB" sz="1600" dirty="0" err="1">
-                <a:latin typeface="DejaVu Sans Book" panose="020B0603030804020204" pitchFamily="34" charset="0"/>
-                <a:ea typeface="DejaVu Sans Book" panose="020B0603030804020204" pitchFamily="34" charset="0"/>
-                <a:cs typeface="DejaVu Sans Book" panose="020B0603030804020204" pitchFamily="34" charset="0"/>
-              </a:rPr>
-              <a:t>printfn</a:t>
-            </a:r>
-            <a:r>
-              <a:rPr lang="en-GB" sz="1600" dirty="0">
-                <a:latin typeface="DejaVu Sans Book" panose="020B0603030804020204" pitchFamily="34" charset="0"/>
-                <a:ea typeface="DejaVu Sans Book" panose="020B0603030804020204" pitchFamily="34" charset="0"/>
-                <a:cs typeface="DejaVu Sans Book" panose="020B0603030804020204" pitchFamily="34" charset="0"/>
-              </a:rPr>
-              <a:t> "3 &gt;= 2";;</a:t>
-            </a:r>
-          </a:p>
-          <a:p>
-            <a:pPr marL="0" indent="0">
-              <a:lnSpc>
-                <a:spcPct val="100000"/>
-              </a:lnSpc>
-              <a:buNone/>
-            </a:pPr>
-            <a:r>
-              <a:rPr lang="en-GB" sz="1600" dirty="0">
-                <a:latin typeface="DejaVu Sans Book" panose="020B0603030804020204" pitchFamily="34" charset="0"/>
-                <a:ea typeface="DejaVu Sans Book" panose="020B0603030804020204" pitchFamily="34" charset="0"/>
-                <a:cs typeface="DejaVu Sans Book" panose="020B0603030804020204" pitchFamily="34" charset="0"/>
-              </a:rPr>
-              <a:t>3 &gt;= 2</a:t>
-            </a:r>
-          </a:p>
-          <a:p>
-            <a:pPr marL="0" indent="0">
-              <a:lnSpc>
-                <a:spcPct val="100000"/>
-              </a:lnSpc>
-              <a:buNone/>
-            </a:pPr>
-            <a:r>
-              <a:rPr lang="en-GB" sz="1600" dirty="0" err="1">
-                <a:latin typeface="DejaVu Sans Book" panose="020B0603030804020204" pitchFamily="34" charset="0"/>
-                <a:ea typeface="DejaVu Sans Book" panose="020B0603030804020204" pitchFamily="34" charset="0"/>
-                <a:cs typeface="DejaVu Sans Book" panose="020B0603030804020204" pitchFamily="34" charset="0"/>
-              </a:rPr>
-              <a:t>val</a:t>
-            </a:r>
-            <a:r>
-              <a:rPr lang="en-GB" sz="1600" dirty="0">
-                <a:latin typeface="DejaVu Sans Book" panose="020B0603030804020204" pitchFamily="34" charset="0"/>
-                <a:ea typeface="DejaVu Sans Book" panose="020B0603030804020204" pitchFamily="34" charset="0"/>
-                <a:cs typeface="DejaVu Sans Book" panose="020B0603030804020204" pitchFamily="34" charset="0"/>
-              </a:rPr>
-              <a:t> it : unit = ()</a:t>
-            </a:r>
-          </a:p>
-        </p:txBody>
-      </p:sp>
-      <p:cxnSp>
-        <p:nvCxnSpPr>
-          <p:cNvPr id="10" name="Straight Connector 9">
-            <a:extLst>
-              <a:ext uri="{FF2B5EF4-FFF2-40B4-BE49-F238E27FC236}">
-                <a16:creationId xmlns:a16="http://schemas.microsoft.com/office/drawing/2014/main" id="{4BA22578-D4F6-CC4B-B003-673CC66F18B3}"/>
-              </a:ext>
-            </a:extLst>
-          </p:cNvPr>
-          <p:cNvCxnSpPr>
-            <a:cxnSpLocks/>
-          </p:cNvCxnSpPr>
-          <p:nvPr/>
-        </p:nvCxnSpPr>
-        <p:spPr>
-          <a:xfrm>
-            <a:off x="4041738" y="1179190"/>
-            <a:ext cx="0" cy="5260571"/>
-          </a:xfrm>
-          <a:prstGeom prst="line">
-            <a:avLst/>
-          </a:prstGeom>
-        </p:spPr>
-        <p:style>
-          <a:lnRef idx="1">
-            <a:schemeClr val="accent1"/>
-          </a:lnRef>
-          <a:fillRef idx="0">
-            <a:schemeClr val="accent1"/>
-          </a:fillRef>
-          <a:effectRef idx="0">
-            <a:schemeClr val="accent1"/>
-          </a:effectRef>
-          <a:fontRef idx="minor">
-            <a:schemeClr val="tx1"/>
-          </a:fontRef>
-        </p:style>
-      </p:cxnSp>
-      <p:sp>
-        <p:nvSpPr>
-          <p:cNvPr id="11" name="TextBox 10">
-            <a:extLst>
-              <a:ext uri="{FF2B5EF4-FFF2-40B4-BE49-F238E27FC236}">
-                <a16:creationId xmlns:a16="http://schemas.microsoft.com/office/drawing/2014/main" id="{9EE123FE-C00C-844E-81A0-A07818ED05A8}"/>
-              </a:ext>
-            </a:extLst>
-          </p:cNvPr>
-          <p:cNvSpPr txBox="1"/>
-          <p:nvPr/>
-        </p:nvSpPr>
-        <p:spPr>
-          <a:xfrm>
-            <a:off x="4359253" y="1291656"/>
-            <a:ext cx="1615892" cy="461665"/>
-          </a:xfrm>
-          <a:prstGeom prst="rect">
-            <a:avLst/>
-          </a:prstGeom>
-          <a:noFill/>
-        </p:spPr>
-        <p:txBody>
-          <a:bodyPr wrap="none" rtlCol="0">
-            <a:spAutoFit/>
-          </a:bodyPr>
-          <a:lstStyle/>
-          <a:p>
-            <a:r>
-              <a:rPr lang="en-GB" sz="2400" dirty="0"/>
-              <a:t>If-then-else</a:t>
-            </a:r>
-          </a:p>
-        </p:txBody>
-      </p:sp>
-      <p:sp>
-        <p:nvSpPr>
-          <p:cNvPr id="12" name="Content Placeholder 2">
-            <a:extLst>
-              <a:ext uri="{FF2B5EF4-FFF2-40B4-BE49-F238E27FC236}">
-                <a16:creationId xmlns:a16="http://schemas.microsoft.com/office/drawing/2014/main" id="{799C16BE-621B-7645-BD01-AA8BD5034D93}"/>
-              </a:ext>
-            </a:extLst>
-          </p:cNvPr>
-          <p:cNvSpPr txBox="1">
-            <a:spLocks/>
-          </p:cNvSpPr>
-          <p:nvPr/>
-        </p:nvSpPr>
-        <p:spPr>
-          <a:xfrm>
-            <a:off x="4646112" y="4340561"/>
-            <a:ext cx="2957868" cy="2206543"/>
-          </a:xfrm>
-          <a:prstGeom prst="rect">
-            <a:avLst/>
-          </a:prstGeom>
-        </p:spPr>
-        <p:txBody>
-          <a:bodyPr vert="horz" lIns="91440" tIns="45720" rIns="91440" bIns="45720" rtlCol="0">
-            <a:noAutofit/>
-          </a:bodyPr>
-          <a:lstStyle>
-            <a:lvl1pPr marL="228600" indent="-228600" algn="l" defTabSz="914400" rtl="0" eaLnBrk="1" latinLnBrk="0" hangingPunct="1">
-              <a:lnSpc>
-                <a:spcPct val="90000"/>
-              </a:lnSpc>
-              <a:spcBef>
-                <a:spcPts val="1000"/>
-              </a:spcBef>
-              <a:buFont typeface="Arial" panose="020B0604020202020204" pitchFamily="34" charset="0"/>
-              <a:buChar char="•"/>
-              <a:defRPr sz="2800" kern="1200">
-                <a:solidFill>
-                  <a:schemeClr val="tx1"/>
-                </a:solidFill>
-                <a:latin typeface="+mn-lt"/>
-                <a:ea typeface="+mn-ea"/>
-                <a:cs typeface="+mn-cs"/>
-              </a:defRPr>
-            </a:lvl1pPr>
-            <a:lvl2pPr marL="685800" indent="-228600" algn="l" defTabSz="914400" rtl="0" eaLnBrk="1" latinLnBrk="0" hangingPunct="1">
-              <a:lnSpc>
-                <a:spcPct val="90000"/>
-              </a:lnSpc>
-              <a:spcBef>
-                <a:spcPts val="500"/>
-              </a:spcBef>
-              <a:buFont typeface="Arial" panose="020B0604020202020204" pitchFamily="34" charset="0"/>
-              <a:buChar char="•"/>
-              <a:defRPr sz="2400" kern="1200">
-                <a:solidFill>
-                  <a:schemeClr val="tx1"/>
-                </a:solidFill>
-                <a:latin typeface="+mn-lt"/>
-                <a:ea typeface="+mn-ea"/>
-                <a:cs typeface="+mn-cs"/>
-              </a:defRPr>
-            </a:lvl2pPr>
-            <a:lvl3pPr marL="1143000" indent="-228600" algn="l" defTabSz="914400" rtl="0" eaLnBrk="1" latinLnBrk="0" hangingPunct="1">
-              <a:lnSpc>
-                <a:spcPct val="90000"/>
-              </a:lnSpc>
-              <a:spcBef>
-                <a:spcPts val="500"/>
-              </a:spcBef>
-              <a:buFont typeface="Arial" panose="020B0604020202020204" pitchFamily="34" charset="0"/>
-              <a:buChar char="•"/>
-              <a:defRPr sz="2000" kern="1200">
-                <a:solidFill>
-                  <a:schemeClr val="tx1"/>
-                </a:solidFill>
-                <a:latin typeface="+mn-lt"/>
-                <a:ea typeface="+mn-ea"/>
-                <a:cs typeface="+mn-cs"/>
-              </a:defRPr>
-            </a:lvl3pPr>
-            <a:lvl4pPr marL="1600200" indent="-228600" algn="l" defTabSz="914400" rtl="0" eaLnBrk="1" latinLnBrk="0" hangingPunct="1">
-              <a:lnSpc>
-                <a:spcPct val="90000"/>
-              </a:lnSpc>
-              <a:spcBef>
-                <a:spcPts val="500"/>
-              </a:spcBef>
-              <a:buFont typeface="Arial" panose="020B0604020202020204" pitchFamily="34" charset="0"/>
-              <a:buChar char="•"/>
-              <a:defRPr sz="1800" kern="1200">
-                <a:solidFill>
-                  <a:schemeClr val="tx1"/>
-                </a:solidFill>
-                <a:latin typeface="+mn-lt"/>
-                <a:ea typeface="+mn-ea"/>
-                <a:cs typeface="+mn-cs"/>
-              </a:defRPr>
-            </a:lvl4pPr>
-            <a:lvl5pPr marL="2057400" indent="-228600" algn="l" defTabSz="914400" rtl="0" eaLnBrk="1" latinLnBrk="0" hangingPunct="1">
-              <a:lnSpc>
-                <a:spcPct val="90000"/>
-              </a:lnSpc>
-              <a:spcBef>
-                <a:spcPts val="500"/>
-              </a:spcBef>
-              <a:buFont typeface="Arial" panose="020B0604020202020204" pitchFamily="34" charset="0"/>
-              <a:buChar char="•"/>
-              <a:defRPr sz="1800" kern="1200">
-                <a:solidFill>
-                  <a:schemeClr val="tx1"/>
-                </a:solidFill>
-                <a:latin typeface="+mn-lt"/>
-                <a:ea typeface="+mn-ea"/>
-                <a:cs typeface="+mn-cs"/>
-              </a:defRPr>
-            </a:lvl5pPr>
-            <a:lvl6pPr marL="2514600" indent="-228600" algn="l" defTabSz="914400" rtl="0" eaLnBrk="1" latinLnBrk="0" hangingPunct="1">
-              <a:lnSpc>
-                <a:spcPct val="90000"/>
-              </a:lnSpc>
-              <a:spcBef>
-                <a:spcPts val="500"/>
-              </a:spcBef>
-              <a:buFont typeface="Arial" panose="020B0604020202020204" pitchFamily="34" charset="0"/>
-              <a:buChar char="•"/>
-              <a:defRPr sz="1800" kern="1200">
-                <a:solidFill>
-                  <a:schemeClr val="tx1"/>
-                </a:solidFill>
-                <a:latin typeface="+mn-lt"/>
-                <a:ea typeface="+mn-ea"/>
-                <a:cs typeface="+mn-cs"/>
-              </a:defRPr>
-            </a:lvl6pPr>
-            <a:lvl7pPr marL="2971800" indent="-228600" algn="l" defTabSz="914400" rtl="0" eaLnBrk="1" latinLnBrk="0" hangingPunct="1">
-              <a:lnSpc>
-                <a:spcPct val="90000"/>
-              </a:lnSpc>
-              <a:spcBef>
-                <a:spcPts val="500"/>
-              </a:spcBef>
-              <a:buFont typeface="Arial" panose="020B0604020202020204" pitchFamily="34" charset="0"/>
-              <a:buChar char="•"/>
-              <a:defRPr sz="1800" kern="1200">
-                <a:solidFill>
-                  <a:schemeClr val="tx1"/>
-                </a:solidFill>
-                <a:latin typeface="+mn-lt"/>
-                <a:ea typeface="+mn-ea"/>
-                <a:cs typeface="+mn-cs"/>
-              </a:defRPr>
-            </a:lvl7pPr>
-            <a:lvl8pPr marL="3429000" indent="-228600" algn="l" defTabSz="914400" rtl="0" eaLnBrk="1" latinLnBrk="0" hangingPunct="1">
-              <a:lnSpc>
-                <a:spcPct val="90000"/>
-              </a:lnSpc>
-              <a:spcBef>
-                <a:spcPts val="500"/>
-              </a:spcBef>
-              <a:buFont typeface="Arial" panose="020B0604020202020204" pitchFamily="34" charset="0"/>
-              <a:buChar char="•"/>
-              <a:defRPr sz="1800" kern="1200">
-                <a:solidFill>
-                  <a:schemeClr val="tx1"/>
-                </a:solidFill>
-                <a:latin typeface="+mn-lt"/>
-                <a:ea typeface="+mn-ea"/>
-                <a:cs typeface="+mn-cs"/>
-              </a:defRPr>
-            </a:lvl8pPr>
-            <a:lvl9pPr marL="3886200" indent="-228600" algn="l" defTabSz="914400" rtl="0" eaLnBrk="1" latinLnBrk="0" hangingPunct="1">
-              <a:lnSpc>
-                <a:spcPct val="90000"/>
-              </a:lnSpc>
-              <a:spcBef>
-                <a:spcPts val="500"/>
-              </a:spcBef>
-              <a:buFont typeface="Arial" panose="020B0604020202020204" pitchFamily="34" charset="0"/>
-              <a:buChar char="•"/>
-              <a:defRPr sz="1800" kern="1200">
-                <a:solidFill>
-                  <a:schemeClr val="tx1"/>
-                </a:solidFill>
-                <a:latin typeface="+mn-lt"/>
-                <a:ea typeface="+mn-ea"/>
-                <a:cs typeface="+mn-cs"/>
-              </a:defRPr>
-            </a:lvl9pPr>
-          </a:lstStyle>
-          <a:p>
-            <a:pPr marL="0" indent="0">
-              <a:lnSpc>
-                <a:spcPct val="100000"/>
-              </a:lnSpc>
-              <a:buNone/>
-            </a:pPr>
-            <a:r>
-              <a:rPr lang="en-GB" sz="1600" dirty="0">
-                <a:latin typeface="DejaVu Sans Book" panose="020B0603030804020204" pitchFamily="34" charset="0"/>
-                <a:ea typeface="DejaVu Sans Book" panose="020B0603030804020204" pitchFamily="34" charset="0"/>
-                <a:cs typeface="DejaVu Sans Book" panose="020B0603030804020204" pitchFamily="34" charset="0"/>
-              </a:rPr>
-              <a:t>&gt; let </a:t>
-            </a:r>
-            <a:r>
-              <a:rPr lang="en-GB" sz="1600" dirty="0" err="1">
-                <a:latin typeface="DejaVu Sans Book" panose="020B0603030804020204" pitchFamily="34" charset="0"/>
-                <a:ea typeface="DejaVu Sans Book" panose="020B0603030804020204" pitchFamily="34" charset="0"/>
-                <a:cs typeface="DejaVu Sans Book" panose="020B0603030804020204" pitchFamily="34" charset="0"/>
-              </a:rPr>
-              <a:t>str</a:t>
-            </a:r>
-            <a:r>
-              <a:rPr lang="en-GB" sz="1600" dirty="0">
-                <a:latin typeface="DejaVu Sans Book" panose="020B0603030804020204" pitchFamily="34" charset="0"/>
-                <a:ea typeface="DejaVu Sans Book" panose="020B0603030804020204" pitchFamily="34" charset="0"/>
-                <a:cs typeface="DejaVu Sans Book" panose="020B0603030804020204" pitchFamily="34" charset="0"/>
-              </a:rPr>
-              <a:t> =</a:t>
-            </a:r>
-          </a:p>
-          <a:p>
-            <a:pPr marL="0" indent="0">
-              <a:lnSpc>
-                <a:spcPct val="100000"/>
-              </a:lnSpc>
-              <a:buNone/>
-            </a:pPr>
-            <a:r>
-              <a:rPr lang="en-GB" sz="1600" dirty="0">
-                <a:latin typeface="DejaVu Sans Book" panose="020B0603030804020204" pitchFamily="34" charset="0"/>
-                <a:ea typeface="DejaVu Sans Book" panose="020B0603030804020204" pitchFamily="34" charset="0"/>
-                <a:cs typeface="DejaVu Sans Book" panose="020B0603030804020204" pitchFamily="34" charset="0"/>
-              </a:rPr>
-              <a:t>-   if 3 &lt; 2 then</a:t>
-            </a:r>
-          </a:p>
-          <a:p>
-            <a:pPr marL="0" indent="0">
-              <a:lnSpc>
-                <a:spcPct val="100000"/>
-              </a:lnSpc>
-              <a:buNone/>
-            </a:pPr>
-            <a:r>
-              <a:rPr lang="en-GB" sz="1600" dirty="0">
-                <a:latin typeface="DejaVu Sans Book" panose="020B0603030804020204" pitchFamily="34" charset="0"/>
-                <a:ea typeface="DejaVu Sans Book" panose="020B0603030804020204" pitchFamily="34" charset="0"/>
-                <a:cs typeface="DejaVu Sans Book" panose="020B0603030804020204" pitchFamily="34" charset="0"/>
-              </a:rPr>
-              <a:t>-     "3 &lt; 2"</a:t>
-            </a:r>
-          </a:p>
-          <a:p>
-            <a:pPr marL="0" indent="0">
-              <a:lnSpc>
-                <a:spcPct val="100000"/>
-              </a:lnSpc>
-              <a:buNone/>
-            </a:pPr>
-            <a:r>
-              <a:rPr lang="en-GB" sz="1600" dirty="0">
-                <a:latin typeface="DejaVu Sans Book" panose="020B0603030804020204" pitchFamily="34" charset="0"/>
-                <a:ea typeface="DejaVu Sans Book" panose="020B0603030804020204" pitchFamily="34" charset="0"/>
-                <a:cs typeface="DejaVu Sans Book" panose="020B0603030804020204" pitchFamily="34" charset="0"/>
-              </a:rPr>
-              <a:t>-   else</a:t>
-            </a:r>
-          </a:p>
-          <a:p>
-            <a:pPr marL="0" indent="0">
-              <a:lnSpc>
-                <a:spcPct val="100000"/>
-              </a:lnSpc>
-              <a:buNone/>
-            </a:pPr>
-            <a:r>
-              <a:rPr lang="en-GB" sz="1600" dirty="0">
-                <a:latin typeface="DejaVu Sans Book" panose="020B0603030804020204" pitchFamily="34" charset="0"/>
-                <a:ea typeface="DejaVu Sans Book" panose="020B0603030804020204" pitchFamily="34" charset="0"/>
-                <a:cs typeface="DejaVu Sans Book" panose="020B0603030804020204" pitchFamily="34" charset="0"/>
-              </a:rPr>
-              <a:t>-     "3 &gt;= 2";;</a:t>
-            </a:r>
-          </a:p>
-          <a:p>
-            <a:pPr marL="0" indent="0">
-              <a:lnSpc>
-                <a:spcPct val="100000"/>
-              </a:lnSpc>
-              <a:buNone/>
-            </a:pPr>
-            <a:r>
-              <a:rPr lang="en-GB" sz="1600" dirty="0" err="1">
-                <a:latin typeface="DejaVu Sans Book" panose="020B0603030804020204" pitchFamily="34" charset="0"/>
-                <a:ea typeface="DejaVu Sans Book" panose="020B0603030804020204" pitchFamily="34" charset="0"/>
-                <a:cs typeface="DejaVu Sans Book" panose="020B0603030804020204" pitchFamily="34" charset="0"/>
-              </a:rPr>
-              <a:t>val</a:t>
-            </a:r>
-            <a:r>
-              <a:rPr lang="en-GB" sz="1600" dirty="0">
-                <a:latin typeface="DejaVu Sans Book" panose="020B0603030804020204" pitchFamily="34" charset="0"/>
-                <a:ea typeface="DejaVu Sans Book" panose="020B0603030804020204" pitchFamily="34" charset="0"/>
-                <a:cs typeface="DejaVu Sans Book" panose="020B0603030804020204" pitchFamily="34" charset="0"/>
-              </a:rPr>
-              <a:t> </a:t>
-            </a:r>
-            <a:r>
-              <a:rPr lang="en-GB" sz="1600" dirty="0" err="1">
-                <a:latin typeface="DejaVu Sans Book" panose="020B0603030804020204" pitchFamily="34" charset="0"/>
-                <a:ea typeface="DejaVu Sans Book" panose="020B0603030804020204" pitchFamily="34" charset="0"/>
-                <a:cs typeface="DejaVu Sans Book" panose="020B0603030804020204" pitchFamily="34" charset="0"/>
-              </a:rPr>
-              <a:t>str</a:t>
-            </a:r>
-            <a:r>
-              <a:rPr lang="en-GB" sz="1600" dirty="0">
-                <a:latin typeface="DejaVu Sans Book" panose="020B0603030804020204" pitchFamily="34" charset="0"/>
-                <a:ea typeface="DejaVu Sans Book" panose="020B0603030804020204" pitchFamily="34" charset="0"/>
-                <a:cs typeface="DejaVu Sans Book" panose="020B0603030804020204" pitchFamily="34" charset="0"/>
-              </a:rPr>
-              <a:t> : string = "3 &gt;= 2"</a:t>
-            </a:r>
-          </a:p>
-        </p:txBody>
-      </p:sp>
-    </p:spTree>
-    <p:extLst>
-      <p:ext uri="{BB962C8B-B14F-4D97-AF65-F5344CB8AC3E}">
-        <p14:creationId xmlns:p14="http://schemas.microsoft.com/office/powerpoint/2010/main" val="2839907258"/>
-      </p:ext>
-    </p:extLst>
-  </p:cSld>
-  <p:clrMapOvr>
-    <a:masterClrMapping/>
-  </p:clrMapOvr>
-  <p:timing>
-    <p:tnLst>
-      <p:par>
-        <p:cTn id="1" dur="indefinite" restart="never" nodeType="tmRoot">
-          <p:childTnLst>
-            <p:seq concurrent="1" nextAc="seek">
-              <p:cTn id="2" dur="indefinite" nodeType="mainSeq">
-                <p:childTnLst>
-                  <p:par>
-                    <p:cTn id="3" fill="hold">
-                      <p:stCondLst>
-                        <p:cond delay="indefinite"/>
-                      </p:stCondLst>
-                      <p:childTnLst>
-                        <p:par>
-                          <p:cTn id="4" fill="hold">
-                            <p:stCondLst>
-                              <p:cond delay="0"/>
-                            </p:stCondLst>
-                            <p:childTnLst>
-                              <p:par>
-                                <p:cTn id="5" presetID="1" presetClass="entr" presetSubtype="0" fill="hold" nodeType="clickEffect">
-                                  <p:stCondLst>
-                                    <p:cond delay="0"/>
-                                  </p:stCondLst>
-                                  <p:childTnLst>
-                                    <p:set>
-                                      <p:cBhvr>
-                                        <p:cTn id="6" dur="1" fill="hold">
-                                          <p:stCondLst>
-                                            <p:cond delay="0"/>
-                                          </p:stCondLst>
-                                        </p:cTn>
-                                        <p:tgtEl>
-                                          <p:spTgt spid="10"/>
-                                        </p:tgtEl>
-                                        <p:attrNameLst>
-                                          <p:attrName>style.visibility</p:attrName>
-                                        </p:attrNameLst>
-                                      </p:cBhvr>
-                                      <p:to>
-                                        <p:strVal val="visible"/>
-                                      </p:to>
-                                    </p:set>
-                                  </p:childTnLst>
-                                </p:cTn>
-                              </p:par>
-                              <p:par>
-                                <p:cTn id="7" presetID="1" presetClass="entr" presetSubtype="0" fill="hold" grpId="0" nodeType="withEffect">
-                                  <p:stCondLst>
-                                    <p:cond delay="0"/>
-                                  </p:stCondLst>
-                                  <p:childTnLst>
-                                    <p:set>
-                                      <p:cBhvr>
-                                        <p:cTn id="8" dur="1" fill="hold">
-                                          <p:stCondLst>
-                                            <p:cond delay="0"/>
-                                          </p:stCondLst>
-                                        </p:cTn>
-                                        <p:tgtEl>
-                                          <p:spTgt spid="11"/>
-                                        </p:tgtEl>
-                                        <p:attrNameLst>
-                                          <p:attrName>style.visibility</p:attrName>
-                                        </p:attrNameLst>
-                                      </p:cBhvr>
-                                      <p:to>
-                                        <p:strVal val="visible"/>
-                                      </p:to>
-                                    </p:set>
-                                  </p:childTnLst>
-                                </p:cTn>
-                              </p:par>
-                              <p:par>
-                                <p:cTn id="9" presetID="1" presetClass="entr" presetSubtype="0" fill="hold" grpId="0" nodeType="withEffect">
-                                  <p:stCondLst>
-                                    <p:cond delay="0"/>
-                                  </p:stCondLst>
-                                  <p:childTnLst>
-                                    <p:set>
-                                      <p:cBhvr>
-                                        <p:cTn id="10" dur="1" fill="hold">
-                                          <p:stCondLst>
-                                            <p:cond delay="0"/>
-                                          </p:stCondLst>
-                                        </p:cTn>
-                                        <p:tgtEl>
-                                          <p:spTgt spid="9"/>
-                                        </p:tgtEl>
-                                        <p:attrNameLst>
-                                          <p:attrName>style.visibility</p:attrName>
-                                        </p:attrNameLst>
-                                      </p:cBhvr>
-                                      <p:to>
-                                        <p:strVal val="visible"/>
-                                      </p:to>
-                                    </p:set>
-                                  </p:childTnLst>
-                                </p:cTn>
-                              </p:par>
-                            </p:childTnLst>
-                          </p:cTn>
-                        </p:par>
-                      </p:childTnLst>
-                    </p:cTn>
-                  </p:par>
-                  <p:par>
-                    <p:cTn id="11" fill="hold">
-                      <p:stCondLst>
-                        <p:cond delay="indefinite"/>
-                      </p:stCondLst>
-                      <p:childTnLst>
-                        <p:par>
-                          <p:cTn id="12" fill="hold">
-                            <p:stCondLst>
-                              <p:cond delay="0"/>
-                            </p:stCondLst>
-                            <p:childTnLst>
-                              <p:par>
-                                <p:cTn id="13" presetID="1" presetClass="entr" presetSubtype="0" fill="hold" grpId="0" nodeType="clickEffect">
-                                  <p:stCondLst>
-                                    <p:cond delay="0"/>
-                                  </p:stCondLst>
-                                  <p:childTnLst>
-                                    <p:set>
-                                      <p:cBhvr>
-                                        <p:cTn id="14" dur="1" fill="hold">
-                                          <p:stCondLst>
-                                            <p:cond delay="0"/>
-                                          </p:stCondLst>
-                                        </p:cTn>
-                                        <p:tgtEl>
-                                          <p:spTgt spid="12"/>
-                                        </p:tgtEl>
-                                        <p:attrNameLst>
-                                          <p:attrName>style.visibility</p:attrName>
-                                        </p:attrNameLst>
-                                      </p:cBhvr>
-                                      <p:to>
-                                        <p:strVal val="visible"/>
-                                      </p:to>
-                                    </p:set>
-                                  </p:childTnLst>
-                                </p:cTn>
-                              </p:par>
-                            </p:childTnLst>
-                          </p:cTn>
-                        </p:par>
-                      </p:childTnLst>
-                    </p:cTn>
-                  </p:par>
-                  <p:par>
-                    <p:cTn id="15" fill="hold">
-                      <p:stCondLst>
-                        <p:cond delay="indefinite"/>
-                      </p:stCondLst>
-                      <p:childTnLst>
-                        <p:par>
-                          <p:cTn id="16" fill="hold">
-                            <p:stCondLst>
-                              <p:cond delay="0"/>
-                            </p:stCondLst>
-                            <p:childTnLst>
-                              <p:par>
-                                <p:cTn id="17" presetID="1" presetClass="entr" presetSubtype="0" fill="hold" nodeType="clickEffect">
-                                  <p:stCondLst>
-                                    <p:cond delay="0"/>
-                                  </p:stCondLst>
-                                  <p:childTnLst>
-                                    <p:set>
-                                      <p:cBhvr>
-                                        <p:cTn id="18" dur="1" fill="hold">
-                                          <p:stCondLst>
-                                            <p:cond delay="0"/>
-                                          </p:stCondLst>
-                                        </p:cTn>
-                                        <p:tgtEl>
-                                          <p:spTgt spid="7"/>
-                                        </p:tgtEl>
-                                        <p:attrNameLst>
-                                          <p:attrName>style.visibility</p:attrName>
-                                        </p:attrNameLst>
-                                      </p:cBhvr>
-                                      <p:to>
-                                        <p:strVal val="visible"/>
-                                      </p:to>
-                                    </p:set>
-                                  </p:childTnLst>
-                                </p:cTn>
-                              </p:par>
-                              <p:par>
-                                <p:cTn id="19" presetID="1" presetClass="entr" presetSubtype="0" fill="hold" grpId="0" nodeType="withEffect">
-                                  <p:stCondLst>
-                                    <p:cond delay="0"/>
-                                  </p:stCondLst>
-                                  <p:childTnLst>
-                                    <p:set>
-                                      <p:cBhvr>
-                                        <p:cTn id="20" dur="1" fill="hold">
-                                          <p:stCondLst>
-                                            <p:cond delay="0"/>
-                                          </p:stCondLst>
-                                        </p:cTn>
-                                        <p:tgtEl>
-                                          <p:spTgt spid="8"/>
-                                        </p:tgtEl>
-                                        <p:attrNameLst>
-                                          <p:attrName>style.visibility</p:attrName>
-                                        </p:attrNameLst>
-                                      </p:cBhvr>
-                                      <p:to>
-                                        <p:strVal val="visible"/>
-                                      </p:to>
-                                    </p:set>
-                                  </p:childTnLst>
-                                </p:cTn>
-                              </p:par>
-                              <p:par>
-                                <p:cTn id="21" presetID="1" presetClass="entr" presetSubtype="0" fill="hold" grpId="0" nodeType="withEffect">
-                                  <p:stCondLst>
-                                    <p:cond delay="0"/>
-                                  </p:stCondLst>
-                                  <p:childTnLst>
-                                    <p:set>
-                                      <p:cBhvr>
-                                        <p:cTn id="22" dur="1" fill="hold">
-                                          <p:stCondLst>
-                                            <p:cond delay="0"/>
-                                          </p:stCondLst>
-                                        </p:cTn>
-                                        <p:tgtEl>
-                                          <p:spTgt spid="6"/>
-                                        </p:tgtEl>
-                                        <p:attrNameLst>
-                                          <p:attrName>style.visibility</p:attrName>
-                                        </p:attrNameLst>
-                                      </p:cBhvr>
-                                      <p:to>
-                                        <p:strVal val="visible"/>
-                                      </p:to>
-                                    </p:set>
-                                  </p:childTnLst>
-                                </p:cTn>
-                              </p:par>
-                            </p:childTnLst>
-                          </p:cTn>
-                        </p:par>
-                      </p:childTnLst>
-                    </p:cTn>
-                  </p:par>
-                </p:childTnLst>
-              </p:cTn>
-              <p:prevCondLst>
-                <p:cond evt="onPrev" delay="0">
-                  <p:tgtEl>
-                    <p:sldTgt/>
-                  </p:tgtEl>
-                </p:cond>
-              </p:prevCondLst>
-              <p:nextCondLst>
-                <p:cond evt="onNext" delay="0">
-                  <p:tgtEl>
-                    <p:sldTgt/>
-                  </p:tgtEl>
-                </p:cond>
-              </p:nextCondLst>
-            </p:seq>
-          </p:childTnLst>
-        </p:cTn>
-      </p:par>
-    </p:tnLst>
-    <p:bldLst>
-      <p:bldP spid="6" grpId="0"/>
-      <p:bldP spid="8" grpId="0"/>
-      <p:bldP spid="9" grpId="0"/>
-      <p:bldP spid="11" grpId="0"/>
-      <p:bldP spid="12" grpId="0"/>
-    </p:bldLst>
-  </p:timing>
 </p:sld>
 </file>
 

</xml_diff>